<commit_message>
added all chapters and first version
</commit_message>
<xml_diff>
--- a/doc/Task03/Task3.pptx
+++ b/doc/Task03/Task3.pptx
@@ -5,17 +5,21 @@
     <p:sldMasterId id="2147483669" r:id="rId4"/>
   </p:sldMasterIdLst>
   <p:notesMasterIdLst>
-    <p:notesMasterId r:id="rId10"/>
+    <p:notesMasterId r:id="rId14"/>
   </p:notesMasterIdLst>
   <p:handoutMasterIdLst>
-    <p:handoutMasterId r:id="rId11"/>
+    <p:handoutMasterId r:id="rId15"/>
   </p:handoutMasterIdLst>
   <p:sldIdLst>
     <p:sldId id="259" r:id="rId5"/>
     <p:sldId id="304" r:id="rId6"/>
     <p:sldId id="306" r:id="rId7"/>
     <p:sldId id="307" r:id="rId8"/>
-    <p:sldId id="305" r:id="rId9"/>
+    <p:sldId id="308" r:id="rId9"/>
+    <p:sldId id="309" r:id="rId10"/>
+    <p:sldId id="310" r:id="rId11"/>
+    <p:sldId id="311" r:id="rId12"/>
+    <p:sldId id="305" r:id="rId13"/>
   </p:sldIdLst>
   <p:sldSz cx="9144000" cy="6858000" type="screen4x3"/>
   <p:notesSz cx="6669088" cy="9926638"/>
@@ -146,7 +150,7 @@
   </p:defaultTextStyle>
   <p:extLst>
     <p:ext uri="{EFAFB233-063F-42B5-8137-9DF3F51BA10A}">
-      <p15:sldGuideLst xmlns:p15="http://schemas.microsoft.com/office/powerpoint/2012/main">
+      <p15:sldGuideLst xmlns:p15="http://schemas.microsoft.com/office/powerpoint/2012/main" xmlns="">
         <p15:guide id="1" orient="horz" pos="2160">
           <p15:clr>
             <a:srgbClr val="A4A3A4"/>
@@ -160,7 +164,7 @@
       </p15:sldGuideLst>
     </p:ext>
     <p:ext uri="{2D200454-40CA-4A62-9FC3-DE9A4176ACB9}">
-      <p15:notesGuideLst xmlns:p15="http://schemas.microsoft.com/office/powerpoint/2012/main">
+      <p15:notesGuideLst xmlns:p15="http://schemas.microsoft.com/office/powerpoint/2012/main" xmlns="">
         <p15:guide id="1" orient="horz" pos="3127">
           <p15:clr>
             <a:srgbClr val="A4A3A4"/>
@@ -1116,15 +1120,15 @@
             <a:noFill/>
           </a:ln>
           <a:extLst>
-            <a:ext uri="{909E8E84-426E-40dd-AFC4-6F175D3DCCD1}">
-              <a14:hiddenFill xmlns:a14="http://schemas.microsoft.com/office/drawing/2010/main" xmlns="">
+            <a:ext uri="{909E8E84-426E-40DD-AFC4-6F175D3DCCD1}">
+              <a14:hiddenFill xmlns:a14="http://schemas.microsoft.com/office/drawing/2010/main">
                 <a:solidFill>
                   <a:srgbClr val="FFFFFF"/>
                 </a:solidFill>
               </a14:hiddenFill>
             </a:ext>
-            <a:ext uri="{91240B29-F687-4f45-9708-019B960494DF}">
-              <a14:hiddenLine xmlns:a14="http://schemas.microsoft.com/office/drawing/2010/main" xmlns="" w="9525">
+            <a:ext uri="{91240B29-F687-4F45-9708-019B960494DF}">
+              <a14:hiddenLine xmlns:a14="http://schemas.microsoft.com/office/drawing/2010/main" w="9525">
                 <a:solidFill>
                   <a:srgbClr val="000000"/>
                 </a:solidFill>
@@ -2856,15 +2860,15 @@
             <a:noFill/>
           </a:ln>
           <a:extLst>
-            <a:ext uri="{909E8E84-426E-40dd-AFC4-6F175D3DCCD1}">
-              <a14:hiddenFill xmlns:a14="http://schemas.microsoft.com/office/drawing/2010/main" xmlns="">
+            <a:ext uri="{909E8E84-426E-40DD-AFC4-6F175D3DCCD1}">
+              <a14:hiddenFill xmlns:a14="http://schemas.microsoft.com/office/drawing/2010/main">
                 <a:solidFill>
                   <a:srgbClr val="FFFFFF"/>
                 </a:solidFill>
               </a14:hiddenFill>
             </a:ext>
-            <a:ext uri="{91240B29-F687-4f45-9708-019B960494DF}">
-              <a14:hiddenLine xmlns:a14="http://schemas.microsoft.com/office/drawing/2010/main" xmlns="" w="9525">
+            <a:ext uri="{91240B29-F687-4F45-9708-019B960494DF}">
+              <a14:hiddenLine xmlns:a14="http://schemas.microsoft.com/office/drawing/2010/main" w="9525">
                 <a:solidFill>
                   <a:srgbClr val="000000"/>
                 </a:solidFill>
@@ -6337,15 +6341,15 @@
             <a:noFill/>
           </a:ln>
           <a:extLst>
-            <a:ext uri="{909E8E84-426E-40dd-AFC4-6F175D3DCCD1}">
-              <a14:hiddenFill xmlns:a14="http://schemas.microsoft.com/office/drawing/2010/main" xmlns="">
+            <a:ext uri="{909E8E84-426E-40DD-AFC4-6F175D3DCCD1}">
+              <a14:hiddenFill xmlns:a14="http://schemas.microsoft.com/office/drawing/2010/main">
                 <a:solidFill>
                   <a:srgbClr val="FFFFFF"/>
                 </a:solidFill>
               </a14:hiddenFill>
             </a:ext>
-            <a:ext uri="{91240B29-F687-4f45-9708-019B960494DF}">
-              <a14:hiddenLine xmlns:a14="http://schemas.microsoft.com/office/drawing/2010/main" xmlns="" w="9525">
+            <a:ext uri="{91240B29-F687-4F45-9708-019B960494DF}">
+              <a14:hiddenLine xmlns:a14="http://schemas.microsoft.com/office/drawing/2010/main" w="9525">
                 <a:solidFill>
                   <a:srgbClr val="000000"/>
                 </a:solidFill>
@@ -7121,11 +7125,7 @@
           <a:p>
             <a:r>
               <a:rPr lang="de-DE" dirty="0" smtClean="0"/>
-              <a:t>CS1: </a:t>
-            </a:r>
-            <a:r>
-              <a:rPr lang="de-DE" dirty="0" smtClean="0"/>
-              <a:t>Task </a:t>
+              <a:t>CS1: Task </a:t>
             </a:r>
             <a:r>
               <a:rPr lang="de-DE" dirty="0"/>
@@ -7152,11 +7152,7 @@
           <a:p>
             <a:r>
               <a:rPr lang="de-CH" b="1" dirty="0" smtClean="0"/>
-              <a:t>14.10.15, </a:t>
-            </a:r>
-            <a:r>
-              <a:rPr lang="de-CH" b="1" dirty="0" smtClean="0"/>
-              <a:t>Gruppe Blau</a:t>
+              <a:t>14.10.15, Gruppe Blau</a:t>
             </a:r>
             <a:endParaRPr lang="de-DE" b="1" dirty="0"/>
           </a:p>
@@ -7736,11 +7732,11 @@
   <p:clrMapOvr>
     <a:masterClrMapping/>
   </p:clrMapOvr>
-  <mc:AlternateContent xmlns:mc="http://schemas.openxmlformats.org/markup-compatibility/2006">
-    <mc:Choice xmlns:p14="http://schemas.microsoft.com/office/powerpoint/2010/main" Requires="p14">
+  <mc:AlternateContent xmlns:mc="http://schemas.openxmlformats.org/markup-compatibility/2006" xmlns:p14="http://schemas.microsoft.com/office/powerpoint/2010/main">
+    <mc:Choice Requires="p14">
       <p:transition p14:dur="0"/>
     </mc:Choice>
-    <mc:Fallback>
+    <mc:Fallback xmlns="">
       <p:transition/>
     </mc:Fallback>
   </mc:AlternateContent>
@@ -8015,6 +8011,294 @@
 </file>
 
 <file path=ppt/slides/slide5.xml><?xml version="1.0" encoding="utf-8"?>
+<p:sld xmlns:a="http://schemas.openxmlformats.org/drawingml/2006/main" xmlns:r="http://schemas.openxmlformats.org/officeDocument/2006/relationships" xmlns:p="http://schemas.openxmlformats.org/presentationml/2006/main">
+  <p:cSld>
+    <p:spTree>
+      <p:nvGrpSpPr>
+        <p:cNvPr id="1" name=""/>
+        <p:cNvGrpSpPr/>
+        <p:nvPr/>
+      </p:nvGrpSpPr>
+      <p:grpSpPr>
+        <a:xfrm>
+          <a:off x="0" y="0"/>
+          <a:ext cx="0" cy="0"/>
+          <a:chOff x="0" y="0"/>
+          <a:chExt cx="0" cy="0"/>
+        </a:xfrm>
+      </p:grpSpPr>
+      <p:sp>
+        <p:nvSpPr>
+          <p:cNvPr id="2" name="Inhaltsplatzhalter 1"/>
+          <p:cNvSpPr>
+            <a:spLocks noGrp="1"/>
+          </p:cNvSpPr>
+          <p:nvPr>
+            <p:ph sz="half" idx="1"/>
+          </p:nvPr>
+        </p:nvSpPr>
+        <p:spPr/>
+        <p:txBody>
+          <a:bodyPr/>
+          <a:lstStyle/>
+          <a:p>
+            <a:endParaRPr lang="de-CH"/>
+          </a:p>
+        </p:txBody>
+      </p:sp>
+      <p:sp>
+        <p:nvSpPr>
+          <p:cNvPr id="3" name="Titel 2"/>
+          <p:cNvSpPr>
+            <a:spLocks noGrp="1"/>
+          </p:cNvSpPr>
+          <p:nvPr>
+            <p:ph type="ctrTitle"/>
+          </p:nvPr>
+        </p:nvSpPr>
+        <p:spPr/>
+        <p:txBody>
+          <a:bodyPr/>
+          <a:lstStyle/>
+          <a:p>
+            <a:r>
+              <a:rPr lang="de-CH" dirty="0" err="1" smtClean="0"/>
+              <a:t>Synthesize</a:t>
+            </a:r>
+            <a:endParaRPr lang="de-CH" dirty="0"/>
+          </a:p>
+        </p:txBody>
+      </p:sp>
+    </p:spTree>
+    <p:extLst>
+      <p:ext uri="{BB962C8B-B14F-4D97-AF65-F5344CB8AC3E}">
+        <p14:creationId xmlns:p14="http://schemas.microsoft.com/office/powerpoint/2010/main" val="4087529979"/>
+      </p:ext>
+    </p:extLst>
+  </p:cSld>
+  <p:clrMapOvr>
+    <a:masterClrMapping/>
+  </p:clrMapOvr>
+</p:sld>
+</file>
+
+<file path=ppt/slides/slide6.xml><?xml version="1.0" encoding="utf-8"?>
+<p:sld xmlns:a="http://schemas.openxmlformats.org/drawingml/2006/main" xmlns:r="http://schemas.openxmlformats.org/officeDocument/2006/relationships" xmlns:p="http://schemas.openxmlformats.org/presentationml/2006/main">
+  <p:cSld>
+    <p:spTree>
+      <p:nvGrpSpPr>
+        <p:cNvPr id="1" name=""/>
+        <p:cNvGrpSpPr/>
+        <p:nvPr/>
+      </p:nvGrpSpPr>
+      <p:grpSpPr>
+        <a:xfrm>
+          <a:off x="0" y="0"/>
+          <a:ext cx="0" cy="0"/>
+          <a:chOff x="0" y="0"/>
+          <a:chExt cx="0" cy="0"/>
+        </a:xfrm>
+      </p:grpSpPr>
+      <p:sp>
+        <p:nvSpPr>
+          <p:cNvPr id="2" name="Inhaltsplatzhalter 1"/>
+          <p:cNvSpPr>
+            <a:spLocks noGrp="1"/>
+          </p:cNvSpPr>
+          <p:nvPr>
+            <p:ph sz="half" idx="1"/>
+          </p:nvPr>
+        </p:nvSpPr>
+        <p:spPr/>
+        <p:txBody>
+          <a:bodyPr/>
+          <a:lstStyle/>
+          <a:p>
+            <a:endParaRPr lang="de-CH"/>
+          </a:p>
+        </p:txBody>
+      </p:sp>
+      <p:sp>
+        <p:nvSpPr>
+          <p:cNvPr id="3" name="Titel 2"/>
+          <p:cNvSpPr>
+            <a:spLocks noGrp="1"/>
+          </p:cNvSpPr>
+          <p:nvPr>
+            <p:ph type="ctrTitle"/>
+          </p:nvPr>
+        </p:nvSpPr>
+        <p:spPr/>
+        <p:txBody>
+          <a:bodyPr/>
+          <a:lstStyle/>
+          <a:p>
+            <a:r>
+              <a:rPr lang="de-CH" dirty="0" smtClean="0"/>
+              <a:t>Design</a:t>
+            </a:r>
+            <a:endParaRPr lang="de-CH" dirty="0"/>
+          </a:p>
+        </p:txBody>
+      </p:sp>
+    </p:spTree>
+    <p:extLst>
+      <p:ext uri="{BB962C8B-B14F-4D97-AF65-F5344CB8AC3E}">
+        <p14:creationId xmlns:p14="http://schemas.microsoft.com/office/powerpoint/2010/main" val="2772796197"/>
+      </p:ext>
+    </p:extLst>
+  </p:cSld>
+  <p:clrMapOvr>
+    <a:masterClrMapping/>
+  </p:clrMapOvr>
+</p:sld>
+</file>
+
+<file path=ppt/slides/slide7.xml><?xml version="1.0" encoding="utf-8"?>
+<p:sld xmlns:a="http://schemas.openxmlformats.org/drawingml/2006/main" xmlns:r="http://schemas.openxmlformats.org/officeDocument/2006/relationships" xmlns:p="http://schemas.openxmlformats.org/presentationml/2006/main">
+  <p:cSld>
+    <p:spTree>
+      <p:nvGrpSpPr>
+        <p:cNvPr id="1" name=""/>
+        <p:cNvGrpSpPr/>
+        <p:nvPr/>
+      </p:nvGrpSpPr>
+      <p:grpSpPr>
+        <a:xfrm>
+          <a:off x="0" y="0"/>
+          <a:ext cx="0" cy="0"/>
+          <a:chOff x="0" y="0"/>
+          <a:chExt cx="0" cy="0"/>
+        </a:xfrm>
+      </p:grpSpPr>
+      <p:sp>
+        <p:nvSpPr>
+          <p:cNvPr id="2" name="Inhaltsplatzhalter 1"/>
+          <p:cNvSpPr>
+            <a:spLocks noGrp="1"/>
+          </p:cNvSpPr>
+          <p:nvPr>
+            <p:ph sz="half" idx="1"/>
+          </p:nvPr>
+        </p:nvSpPr>
+        <p:spPr/>
+        <p:txBody>
+          <a:bodyPr/>
+          <a:lstStyle/>
+          <a:p>
+            <a:endParaRPr lang="de-CH"/>
+          </a:p>
+        </p:txBody>
+      </p:sp>
+      <p:sp>
+        <p:nvSpPr>
+          <p:cNvPr id="3" name="Titel 2"/>
+          <p:cNvSpPr>
+            <a:spLocks noGrp="1"/>
+          </p:cNvSpPr>
+          <p:nvPr>
+            <p:ph type="ctrTitle"/>
+          </p:nvPr>
+        </p:nvSpPr>
+        <p:spPr/>
+        <p:txBody>
+          <a:bodyPr/>
+          <a:lstStyle/>
+          <a:p>
+            <a:r>
+              <a:rPr lang="de-CH" dirty="0" smtClean="0"/>
+              <a:t>Prototype</a:t>
+            </a:r>
+            <a:endParaRPr lang="de-CH" dirty="0"/>
+          </a:p>
+        </p:txBody>
+      </p:sp>
+    </p:spTree>
+    <p:extLst>
+      <p:ext uri="{BB962C8B-B14F-4D97-AF65-F5344CB8AC3E}">
+        <p14:creationId xmlns:p14="http://schemas.microsoft.com/office/powerpoint/2010/main" val="1251349615"/>
+      </p:ext>
+    </p:extLst>
+  </p:cSld>
+  <p:clrMapOvr>
+    <a:masterClrMapping/>
+  </p:clrMapOvr>
+</p:sld>
+</file>
+
+<file path=ppt/slides/slide8.xml><?xml version="1.0" encoding="utf-8"?>
+<p:sld xmlns:a="http://schemas.openxmlformats.org/drawingml/2006/main" xmlns:r="http://schemas.openxmlformats.org/officeDocument/2006/relationships" xmlns:p="http://schemas.openxmlformats.org/presentationml/2006/main">
+  <p:cSld>
+    <p:spTree>
+      <p:nvGrpSpPr>
+        <p:cNvPr id="1" name=""/>
+        <p:cNvGrpSpPr/>
+        <p:nvPr/>
+      </p:nvGrpSpPr>
+      <p:grpSpPr>
+        <a:xfrm>
+          <a:off x="0" y="0"/>
+          <a:ext cx="0" cy="0"/>
+          <a:chOff x="0" y="0"/>
+          <a:chExt cx="0" cy="0"/>
+        </a:xfrm>
+      </p:grpSpPr>
+      <p:sp>
+        <p:nvSpPr>
+          <p:cNvPr id="2" name="Inhaltsplatzhalter 1"/>
+          <p:cNvSpPr>
+            <a:spLocks noGrp="1"/>
+          </p:cNvSpPr>
+          <p:nvPr>
+            <p:ph sz="half" idx="1"/>
+          </p:nvPr>
+        </p:nvSpPr>
+        <p:spPr/>
+        <p:txBody>
+          <a:bodyPr/>
+          <a:lstStyle/>
+          <a:p>
+            <a:endParaRPr lang="de-CH"/>
+          </a:p>
+        </p:txBody>
+      </p:sp>
+      <p:sp>
+        <p:nvSpPr>
+          <p:cNvPr id="3" name="Titel 2"/>
+          <p:cNvSpPr>
+            <a:spLocks noGrp="1"/>
+          </p:cNvSpPr>
+          <p:nvPr>
+            <p:ph type="ctrTitle"/>
+          </p:nvPr>
+        </p:nvSpPr>
+        <p:spPr/>
+        <p:txBody>
+          <a:bodyPr/>
+          <a:lstStyle/>
+          <a:p>
+            <a:r>
+              <a:rPr lang="de-CH" dirty="0" err="1" smtClean="0"/>
+              <a:t>Valitation</a:t>
+            </a:r>
+            <a:endParaRPr lang="de-CH" dirty="0"/>
+          </a:p>
+        </p:txBody>
+      </p:sp>
+    </p:spTree>
+    <p:extLst>
+      <p:ext uri="{BB962C8B-B14F-4D97-AF65-F5344CB8AC3E}">
+        <p14:creationId xmlns:p14="http://schemas.microsoft.com/office/powerpoint/2010/main" val="605634403"/>
+      </p:ext>
+    </p:extLst>
+  </p:cSld>
+  <p:clrMapOvr>
+    <a:masterClrMapping/>
+  </p:clrMapOvr>
+</p:sld>
+</file>
+
+<file path=ppt/slides/slide9.xml><?xml version="1.0" encoding="utf-8"?>
 <p:sld xmlns:a="http://schemas.openxmlformats.org/drawingml/2006/main" xmlns:r="http://schemas.openxmlformats.org/officeDocument/2006/relationships" xmlns:p="http://schemas.openxmlformats.org/presentationml/2006/main">
   <p:cSld>
     <p:spTree>
@@ -8905,6 +9189,23 @@
 </file>
 
 <file path=customXml/item1.xml><?xml version="1.0" encoding="utf-8"?>
+<p:properties xmlns:p="http://schemas.microsoft.com/office/2006/metadata/properties" xmlns:xsi="http://www.w3.org/2001/XMLSchema-instance">
+  <documentManagement>
+    <AVMTitle xmlns="5091c847-84be-4f4f-b16c-c018ad2ca66b">Präsentation BFH_2013</AVMTitle>
+  </documentManagement>
+</p:properties>
+</file>
+
+<file path=customXml/item2.xml><?xml version="1.0" encoding="utf-8"?>
+<?mso-contentType ?>
+<FormTemplates xmlns="http://schemas.microsoft.com/sharepoint/v3/contenttype/forms">
+  <Display>DocumentLibraryForm</Display>
+  <Edit>DocumentLibraryForm</Edit>
+  <New>DocumentLibraryForm</New>
+</FormTemplates>
+</file>
+
+<file path=customXml/item3.xml><?xml version="1.0" encoding="utf-8"?>
 <ct:contentTypeSchema xmlns:ct="http://schemas.microsoft.com/office/2006/metadata/contentType" xmlns:ma="http://schemas.microsoft.com/office/2006/metadata/properties/metaAttributes" ct:_="" ma:_="" ma:contentTypeName="Dokument" ma:contentTypeID="0x010100EBE3A9EFF36793468C03E2811ACE2A2B" ma:contentTypeVersion="1" ma:contentTypeDescription="Ein neues Dokument erstellen." ma:contentTypeScope="" ma:versionID="e65be32cb1bfff77fc8c9c09bf542651">
   <xsd:schema xmlns:xsd="http://www.w3.org/2001/XMLSchema" xmlns:p="http://schemas.microsoft.com/office/2006/metadata/properties" xmlns:ns2="5091c847-84be-4f4f-b16c-c018ad2ca66b" targetNamespace="http://schemas.microsoft.com/office/2006/metadata/properties" ma:root="true" ma:fieldsID="7636c84aed5b7d09a166fcef888725d4" ns2:_="">
     <xsd:import namespace="5091c847-84be-4f4f-b16c-c018ad2ca66b"/>
@@ -8964,24 +9265,30 @@
 </ct:contentTypeSchema>
 </file>
 
-<file path=customXml/item2.xml><?xml version="1.0" encoding="utf-8"?>
-<?mso-contentType ?>
-<FormTemplates xmlns="http://schemas.microsoft.com/sharepoint/v3/contenttype/forms">
-  <Display>DocumentLibraryForm</Display>
-  <Edit>DocumentLibraryForm</Edit>
-  <New>DocumentLibraryForm</New>
-</FormTemplates>
+<file path=customXml/itemProps1.xml><?xml version="1.0" encoding="utf-8"?>
+<ds:datastoreItem xmlns:ds="http://schemas.openxmlformats.org/officeDocument/2006/customXml" ds:itemID="{32991507-CB83-4F49-BAFB-D322B1D04098}">
+  <ds:schemaRefs>
+    <ds:schemaRef ds:uri="http://purl.org/dc/terms/"/>
+    <ds:schemaRef ds:uri="http://schemas.openxmlformats.org/package/2006/metadata/core-properties"/>
+    <ds:schemaRef ds:uri="http://schemas.microsoft.com/office/2006/documentManagement/types"/>
+    <ds:schemaRef ds:uri="5091c847-84be-4f4f-b16c-c018ad2ca66b"/>
+    <ds:schemaRef ds:uri="http://purl.org/dc/elements/1.1/"/>
+    <ds:schemaRef ds:uri="http://schemas.microsoft.com/office/2006/metadata/properties"/>
+    <ds:schemaRef ds:uri="http://www.w3.org/XML/1998/namespace"/>
+    <ds:schemaRef ds:uri="http://purl.org/dc/dcmitype/"/>
+  </ds:schemaRefs>
+</ds:datastoreItem>
 </file>
 
-<file path=customXml/item3.xml><?xml version="1.0" encoding="utf-8"?>
-<p:properties xmlns:p="http://schemas.microsoft.com/office/2006/metadata/properties" xmlns:xsi="http://www.w3.org/2001/XMLSchema-instance">
-  <documentManagement>
-    <AVMTitle xmlns="5091c847-84be-4f4f-b16c-c018ad2ca66b">Präsentation BFH_2013</AVMTitle>
-  </documentManagement>
-</p:properties>
+<file path=customXml/itemProps2.xml><?xml version="1.0" encoding="utf-8"?>
+<ds:datastoreItem xmlns:ds="http://schemas.openxmlformats.org/officeDocument/2006/customXml" ds:itemID="{1851D33F-E468-417B-A30C-509B68D2BD09}">
+  <ds:schemaRefs>
+    <ds:schemaRef ds:uri="http://schemas.microsoft.com/sharepoint/v3/contenttype/forms"/>
+  </ds:schemaRefs>
+</ds:datastoreItem>
 </file>
 
-<file path=customXml/itemProps1.xml><?xml version="1.0" encoding="utf-8"?>
+<file path=customXml/itemProps3.xml><?xml version="1.0" encoding="utf-8"?>
 <ds:datastoreItem xmlns:ds="http://schemas.openxmlformats.org/officeDocument/2006/customXml" ds:itemID="{15287BEA-F3FF-4B87-929B-5D0092183197}">
   <ds:schemaRefs>
     <ds:schemaRef ds:uri="http://schemas.microsoft.com/office/2006/metadata/contentType"/>
@@ -8996,27 +9303,4 @@
     <ds:schemaRef ds:uri="http://schemas.microsoft.com/office/internal/2005/internalDocumentation"/>
   </ds:schemaRefs>
 </ds:datastoreItem>
-</file>
-
-<file path=customXml/itemProps2.xml><?xml version="1.0" encoding="utf-8"?>
-<ds:datastoreItem xmlns:ds="http://schemas.openxmlformats.org/officeDocument/2006/customXml" ds:itemID="{1851D33F-E468-417B-A30C-509B68D2BD09}">
-  <ds:schemaRefs>
-    <ds:schemaRef ds:uri="http://schemas.microsoft.com/sharepoint/v3/contenttype/forms"/>
-  </ds:schemaRefs>
-</ds:datastoreItem>
-</file>
-
-<file path=customXml/itemProps3.xml><?xml version="1.0" encoding="utf-8"?>
-<ds:datastoreItem xmlns:ds="http://schemas.openxmlformats.org/officeDocument/2006/customXml" ds:itemID="{32991507-CB83-4F49-BAFB-D322B1D04098}">
-  <ds:schemaRefs>
-    <ds:schemaRef ds:uri="http://purl.org/dc/terms/"/>
-    <ds:schemaRef ds:uri="http://schemas.openxmlformats.org/package/2006/metadata/core-properties"/>
-    <ds:schemaRef ds:uri="http://schemas.microsoft.com/office/2006/documentManagement/types"/>
-    <ds:schemaRef ds:uri="5091c847-84be-4f4f-b16c-c018ad2ca66b"/>
-    <ds:schemaRef ds:uri="http://purl.org/dc/elements/1.1/"/>
-    <ds:schemaRef ds:uri="http://schemas.microsoft.com/office/2006/metadata/properties"/>
-    <ds:schemaRef ds:uri="http://www.w3.org/XML/1998/namespace"/>
-    <ds:schemaRef ds:uri="http://purl.org/dc/dcmitype/"/>
-  </ds:schemaRefs>
-</ds:datastoreItem>
 </file>
</xml_diff>

<commit_message>
Added Storyboards and some more details to doc/Task03/Task03.docx and Task03/Task3.pptx
</commit_message>
<xml_diff>
--- a/doc/Task03/Task3.pptx
+++ b/doc/Task03/Task3.pptx
@@ -5,10 +5,10 @@
     <p:sldMasterId id="2147483669" r:id="rId4"/>
   </p:sldMasterIdLst>
   <p:notesMasterIdLst>
-    <p:notesMasterId r:id="rId14"/>
+    <p:notesMasterId r:id="rId15"/>
   </p:notesMasterIdLst>
   <p:handoutMasterIdLst>
-    <p:handoutMasterId r:id="rId15"/>
+    <p:handoutMasterId r:id="rId16"/>
   </p:handoutMasterIdLst>
   <p:sldIdLst>
     <p:sldId id="259" r:id="rId5"/>
@@ -17,9 +17,10 @@
     <p:sldId id="307" r:id="rId8"/>
     <p:sldId id="308" r:id="rId9"/>
     <p:sldId id="309" r:id="rId10"/>
-    <p:sldId id="310" r:id="rId11"/>
-    <p:sldId id="311" r:id="rId12"/>
-    <p:sldId id="305" r:id="rId13"/>
+    <p:sldId id="312" r:id="rId11"/>
+    <p:sldId id="310" r:id="rId12"/>
+    <p:sldId id="311" r:id="rId13"/>
+    <p:sldId id="305" r:id="rId14"/>
   </p:sldIdLst>
   <p:sldSz cx="9144000" cy="6858000" type="screen4x3"/>
   <p:notesSz cx="6669088" cy="9926638"/>
@@ -150,7 +151,7 @@
   </p:defaultTextStyle>
   <p:extLst>
     <p:ext uri="{EFAFB233-063F-42B5-8137-9DF3F51BA10A}">
-      <p15:sldGuideLst xmlns:p15="http://schemas.microsoft.com/office/powerpoint/2012/main">
+      <p15:sldGuideLst xmlns:p15="http://schemas.microsoft.com/office/powerpoint/2012/main" xmlns="">
         <p15:guide id="1" orient="horz" pos="2160">
           <p15:clr>
             <a:srgbClr val="A4A3A4"/>
@@ -164,7 +165,7 @@
       </p15:sldGuideLst>
     </p:ext>
     <p:ext uri="{2D200454-40CA-4A62-9FC3-DE9A4176ACB9}">
-      <p15:notesGuideLst xmlns:p15="http://schemas.microsoft.com/office/powerpoint/2012/main">
+      <p15:notesGuideLst xmlns:p15="http://schemas.microsoft.com/office/powerpoint/2012/main" xmlns="">
         <p15:guide id="1" orient="horz" pos="3127">
           <p15:clr>
             <a:srgbClr val="A4A3A4"/>
@@ -263,7 +264,7 @@
           <a:p>
             <a:fld id="{EFA0D184-D464-48E9-9CA0-A94E873F6C2C}" type="datetimeFigureOut">
               <a:rPr lang="de-CH" smtClean="0"/>
-              <a:t>13.10.2015</a:t>
+              <a:t>14.10.2015</a:t>
             </a:fld>
             <a:endParaRPr lang="de-CH"/>
           </a:p>
@@ -428,7 +429,7 @@
           <a:p>
             <a:fld id="{5AF2B663-2BA9-4D7E-8201-5DE4109E1EDD}" type="datetimeFigureOut">
               <a:rPr lang="de-CH" smtClean="0"/>
-              <a:t>13.10.2015</a:t>
+              <a:t>14.10.2015</a:t>
             </a:fld>
             <a:endParaRPr lang="de-CH"/>
           </a:p>
@@ -7200,6 +7201,66 @@
 </p:sld>
 </file>
 
+<file path=ppt/slides/slide10.xml><?xml version="1.0" encoding="utf-8"?>
+<p:sld xmlns:a="http://schemas.openxmlformats.org/drawingml/2006/main" xmlns:r="http://schemas.openxmlformats.org/officeDocument/2006/relationships" xmlns:p="http://schemas.openxmlformats.org/presentationml/2006/main">
+  <p:cSld>
+    <p:spTree>
+      <p:nvGrpSpPr>
+        <p:cNvPr id="1" name=""/>
+        <p:cNvGrpSpPr/>
+        <p:nvPr/>
+      </p:nvGrpSpPr>
+      <p:grpSpPr>
+        <a:xfrm>
+          <a:off x="0" y="0"/>
+          <a:ext cx="0" cy="0"/>
+          <a:chOff x="0" y="0"/>
+          <a:chExt cx="0" cy="0"/>
+        </a:xfrm>
+      </p:grpSpPr>
+      <p:sp>
+        <p:nvSpPr>
+          <p:cNvPr id="2" name="Titel 1"/>
+          <p:cNvSpPr>
+            <a:spLocks noGrp="1"/>
+          </p:cNvSpPr>
+          <p:nvPr>
+            <p:ph type="ctrTitle"/>
+          </p:nvPr>
+        </p:nvSpPr>
+        <p:spPr/>
+        <p:txBody>
+          <a:bodyPr/>
+          <a:lstStyle/>
+          <a:p>
+            <a:r>
+              <a:rPr lang="de-DE" dirty="0"/>
+              <a:t>Herzlichen Dank!</a:t>
+            </a:r>
+            <a:endParaRPr lang="de-CH" dirty="0"/>
+          </a:p>
+        </p:txBody>
+      </p:sp>
+    </p:spTree>
+    <p:extLst>
+      <p:ext uri="{BB962C8B-B14F-4D97-AF65-F5344CB8AC3E}">
+        <p14:creationId xmlns:p14="http://schemas.microsoft.com/office/powerpoint/2010/main" val="1252526614"/>
+      </p:ext>
+    </p:extLst>
+  </p:cSld>
+  <p:clrMapOvr>
+    <a:masterClrMapping/>
+  </p:clrMapOvr>
+  <p:timing>
+    <p:tnLst>
+      <p:par>
+        <p:cTn id="1" dur="indefinite" restart="never" nodeType="tmRoot"/>
+      </p:par>
+    </p:tnLst>
+  </p:timing>
+</p:sld>
+</file>
+
 <file path=ppt/slides/slide2.xml><?xml version="1.0" encoding="utf-8"?>
 <p:sld xmlns:a="http://schemas.openxmlformats.org/drawingml/2006/main" xmlns:r="http://schemas.openxmlformats.org/officeDocument/2006/relationships" xmlns:p="http://schemas.openxmlformats.org/presentationml/2006/main">
   <p:cSld>
@@ -8293,7 +8354,20 @@
           <a:bodyPr/>
           <a:lstStyle/>
           <a:p>
-            <a:endParaRPr lang="de-CH"/>
+            <a:r>
+              <a:rPr lang="de-CH" dirty="0"/>
+              <a:t>Terminablauf mit einem Patienten im Büro des </a:t>
+            </a:r>
+            <a:r>
+              <a:rPr lang="de-CH" dirty="0" smtClean="0"/>
+              <a:t>Sozialarbeiter</a:t>
+            </a:r>
+          </a:p>
+          <a:p>
+            <a:pPr marL="0" indent="0">
+              <a:buNone/>
+            </a:pPr>
+            <a:endParaRPr lang="de-CH" dirty="0"/>
           </a:p>
         </p:txBody>
       </p:sp>
@@ -8317,6 +8391,274 @@
               <a:t>Design</a:t>
             </a:r>
             <a:endParaRPr lang="de-CH" dirty="0"/>
+          </a:p>
+        </p:txBody>
+      </p:sp>
+      <p:pic>
+        <p:nvPicPr>
+          <p:cNvPr id="1029" name="Bild 16"/>
+          <p:cNvPicPr>
+            <a:picLocks noChangeAspect="1" noChangeArrowheads="1"/>
+          </p:cNvPicPr>
+          <p:nvPr/>
+        </p:nvPicPr>
+        <p:blipFill>
+          <a:blip r:embed="rId2">
+            <a:extLst>
+              <a:ext uri="{28A0092B-C50C-407E-A947-70E740481C1C}">
+                <a14:useLocalDpi xmlns:a14="http://schemas.microsoft.com/office/drawing/2010/main" val="0"/>
+              </a:ext>
+            </a:extLst>
+          </a:blip>
+          <a:srcRect/>
+          <a:stretch>
+            <a:fillRect/>
+          </a:stretch>
+        </p:blipFill>
+        <p:spPr bwMode="auto">
+          <a:xfrm rot="-5400000">
+            <a:off x="1429726" y="1917944"/>
+            <a:ext cx="1841500" cy="1758950"/>
+          </a:xfrm>
+          <a:prstGeom prst="rect">
+            <a:avLst/>
+          </a:prstGeom>
+          <a:noFill/>
+          <a:extLst>
+            <a:ext uri="{909E8E84-426E-40DD-AFC4-6F175D3DCCD1}">
+              <a14:hiddenFill xmlns:a14="http://schemas.microsoft.com/office/drawing/2010/main">
+                <a:solidFill>
+                  <a:srgbClr val="FFFFFF"/>
+                </a:solidFill>
+              </a14:hiddenFill>
+            </a:ext>
+          </a:extLst>
+        </p:spPr>
+      </p:pic>
+      <p:pic>
+        <p:nvPicPr>
+          <p:cNvPr id="1028" name="Bild 17"/>
+          <p:cNvPicPr>
+            <a:picLocks noChangeAspect="1" noChangeArrowheads="1"/>
+          </p:cNvPicPr>
+          <p:nvPr/>
+        </p:nvPicPr>
+        <p:blipFill>
+          <a:blip r:embed="rId3">
+            <a:extLst>
+              <a:ext uri="{28A0092B-C50C-407E-A947-70E740481C1C}">
+                <a14:useLocalDpi xmlns:a14="http://schemas.microsoft.com/office/drawing/2010/main" val="0"/>
+              </a:ext>
+            </a:extLst>
+          </a:blip>
+          <a:srcRect/>
+          <a:stretch>
+            <a:fillRect/>
+          </a:stretch>
+        </p:blipFill>
+        <p:spPr bwMode="auto">
+          <a:xfrm rot="-5400000">
+            <a:off x="3332284" y="2203694"/>
+            <a:ext cx="1835150" cy="1155700"/>
+          </a:xfrm>
+          <a:prstGeom prst="rect">
+            <a:avLst/>
+          </a:prstGeom>
+          <a:noFill/>
+          <a:extLst>
+            <a:ext uri="{909E8E84-426E-40DD-AFC4-6F175D3DCCD1}">
+              <a14:hiddenFill xmlns:a14="http://schemas.microsoft.com/office/drawing/2010/main">
+                <a:solidFill>
+                  <a:srgbClr val="FFFFFF"/>
+                </a:solidFill>
+              </a14:hiddenFill>
+            </a:ext>
+          </a:extLst>
+        </p:spPr>
+      </p:pic>
+      <p:pic>
+        <p:nvPicPr>
+          <p:cNvPr id="1027" name="Bild 18"/>
+          <p:cNvPicPr>
+            <a:picLocks noChangeAspect="1" noChangeArrowheads="1"/>
+          </p:cNvPicPr>
+          <p:nvPr/>
+        </p:nvPicPr>
+        <p:blipFill>
+          <a:blip r:embed="rId4">
+            <a:extLst>
+              <a:ext uri="{28A0092B-C50C-407E-A947-70E740481C1C}">
+                <a14:useLocalDpi xmlns:a14="http://schemas.microsoft.com/office/drawing/2010/main" val="0"/>
+              </a:ext>
+            </a:extLst>
+          </a:blip>
+          <a:srcRect/>
+          <a:stretch>
+            <a:fillRect/>
+          </a:stretch>
+        </p:blipFill>
+        <p:spPr bwMode="auto">
+          <a:xfrm rot="-5400000">
+            <a:off x="4970829" y="2235444"/>
+            <a:ext cx="1822450" cy="1079500"/>
+          </a:xfrm>
+          <a:prstGeom prst="rect">
+            <a:avLst/>
+          </a:prstGeom>
+          <a:noFill/>
+          <a:extLst>
+            <a:ext uri="{909E8E84-426E-40DD-AFC4-6F175D3DCCD1}">
+              <a14:hiddenFill xmlns:a14="http://schemas.microsoft.com/office/drawing/2010/main">
+                <a:solidFill>
+                  <a:srgbClr val="FFFFFF"/>
+                </a:solidFill>
+              </a14:hiddenFill>
+            </a:ext>
+          </a:extLst>
+        </p:spPr>
+      </p:pic>
+      <p:pic>
+        <p:nvPicPr>
+          <p:cNvPr id="1026" name="Bild 19"/>
+          <p:cNvPicPr>
+            <a:picLocks noChangeAspect="1" noChangeArrowheads="1"/>
+          </p:cNvPicPr>
+          <p:nvPr/>
+        </p:nvPicPr>
+        <p:blipFill>
+          <a:blip r:embed="rId5">
+            <a:extLst>
+              <a:ext uri="{28A0092B-C50C-407E-A947-70E740481C1C}">
+                <a14:useLocalDpi xmlns:a14="http://schemas.microsoft.com/office/drawing/2010/main" val="0"/>
+              </a:ext>
+            </a:extLst>
+          </a:blip>
+          <a:srcRect/>
+          <a:stretch>
+            <a:fillRect/>
+          </a:stretch>
+        </p:blipFill>
+        <p:spPr bwMode="auto">
+          <a:xfrm rot="-5400000">
+            <a:off x="1344001" y="4018084"/>
+            <a:ext cx="1682750" cy="1428750"/>
+          </a:xfrm>
+          <a:prstGeom prst="rect">
+            <a:avLst/>
+          </a:prstGeom>
+          <a:noFill/>
+          <a:extLst>
+            <a:ext uri="{909E8E84-426E-40DD-AFC4-6F175D3DCCD1}">
+              <a14:hiddenFill xmlns:a14="http://schemas.microsoft.com/office/drawing/2010/main">
+                <a:solidFill>
+                  <a:srgbClr val="FFFFFF"/>
+                </a:solidFill>
+              </a14:hiddenFill>
+            </a:ext>
+          </a:extLst>
+        </p:spPr>
+      </p:pic>
+      <p:pic>
+        <p:nvPicPr>
+          <p:cNvPr id="1025" name="Bild 20"/>
+          <p:cNvPicPr>
+            <a:picLocks noChangeAspect="1" noChangeArrowheads="1"/>
+          </p:cNvPicPr>
+          <p:nvPr/>
+        </p:nvPicPr>
+        <p:blipFill>
+          <a:blip r:embed="rId6">
+            <a:extLst>
+              <a:ext uri="{28A0092B-C50C-407E-A947-70E740481C1C}">
+                <a14:useLocalDpi xmlns:a14="http://schemas.microsoft.com/office/drawing/2010/main" val="0"/>
+              </a:ext>
+            </a:extLst>
+          </a:blip>
+          <a:srcRect/>
+          <a:stretch>
+            <a:fillRect/>
+          </a:stretch>
+        </p:blipFill>
+        <p:spPr bwMode="auto">
+          <a:xfrm rot="-5400000">
+            <a:off x="3402133" y="4030784"/>
+            <a:ext cx="1695450" cy="1403350"/>
+          </a:xfrm>
+          <a:prstGeom prst="rect">
+            <a:avLst/>
+          </a:prstGeom>
+          <a:noFill/>
+          <a:extLst>
+            <a:ext uri="{909E8E84-426E-40DD-AFC4-6F175D3DCCD1}">
+              <a14:hiddenFill xmlns:a14="http://schemas.microsoft.com/office/drawing/2010/main">
+                <a:solidFill>
+                  <a:srgbClr val="FFFFFF"/>
+                </a:solidFill>
+              </a14:hiddenFill>
+            </a:ext>
+          </a:extLst>
+        </p:spPr>
+      </p:pic>
+      <p:sp>
+        <p:nvSpPr>
+          <p:cNvPr id="4" name="Rectangle 6"/>
+          <p:cNvSpPr>
+            <a:spLocks noChangeArrowheads="1"/>
+          </p:cNvSpPr>
+          <p:nvPr/>
+        </p:nvSpPr>
+        <p:spPr bwMode="auto">
+          <a:xfrm>
+            <a:off x="0" y="0"/>
+            <a:ext cx="9144000" cy="457200"/>
+          </a:xfrm>
+          <a:prstGeom prst="rect">
+            <a:avLst/>
+          </a:prstGeom>
+          <a:noFill/>
+          <a:ln>
+            <a:noFill/>
+          </a:ln>
+          <a:effectLst/>
+          <a:extLst>
+            <a:ext uri="{909E8E84-426E-40DD-AFC4-6F175D3DCCD1}">
+              <a14:hiddenFill xmlns:a14="http://schemas.microsoft.com/office/drawing/2010/main">
+                <a:solidFill>
+                  <a:schemeClr val="accent1"/>
+                </a:solidFill>
+              </a14:hiddenFill>
+            </a:ext>
+            <a:ext uri="{91240B29-F687-4F45-9708-019B960494DF}">
+              <a14:hiddenLine xmlns:a14="http://schemas.microsoft.com/office/drawing/2010/main" w="9525">
+                <a:solidFill>
+                  <a:schemeClr val="tx1"/>
+                </a:solidFill>
+                <a:miter lim="800000"/>
+                <a:headEnd/>
+                <a:tailEnd/>
+              </a14:hiddenLine>
+            </a:ext>
+            <a:ext uri="{AF507438-7753-43E0-B8FC-AC1667EBCBE1}">
+              <a14:hiddenEffects xmlns:a14="http://schemas.microsoft.com/office/drawing/2010/main">
+                <a:effectLst>
+                  <a:outerShdw dist="35921" dir="2700000" algn="ctr" rotWithShape="0">
+                    <a:schemeClr val="bg2"/>
+                  </a:outerShdw>
+                </a:effectLst>
+              </a14:hiddenEffects>
+            </a:ext>
+          </a:extLst>
+        </p:spPr>
+        <p:txBody>
+          <a:bodyPr vert="horz" wrap="none" lIns="91440" tIns="45720" rIns="91440" bIns="45720" numCol="1" anchor="ctr" anchorCtr="0" compatLnSpc="1">
+            <a:prstTxWarp prst="textNoShape">
+              <a:avLst/>
+            </a:prstTxWarp>
+            <a:spAutoFit/>
+          </a:bodyPr>
+          <a:lstStyle/>
+          <a:p>
+            <a:endParaRPr lang="de-CH"/>
           </a:p>
         </p:txBody>
       </p:sp>
@@ -8372,7 +8714,11 @@
           <a:bodyPr/>
           <a:lstStyle/>
           <a:p>
-            <a:endParaRPr lang="de-CH"/>
+            <a:r>
+              <a:rPr lang="de-CH" dirty="0" smtClean="0"/>
+              <a:t>Termin mit einem Patienten vereinbaren</a:t>
+            </a:r>
+            <a:endParaRPr lang="de-CH" dirty="0"/>
           </a:p>
         </p:txBody>
       </p:sp>
@@ -8393,29 +8739,338 @@
           <a:p>
             <a:r>
               <a:rPr lang="de-CH" dirty="0" smtClean="0"/>
-              <a:t>Prototype</a:t>
+              <a:t>Design</a:t>
             </a:r>
             <a:endParaRPr lang="de-CH" dirty="0"/>
+          </a:p>
+        </p:txBody>
+      </p:sp>
+      <p:pic>
+        <p:nvPicPr>
+          <p:cNvPr id="2052" name="Picture 4"/>
+          <p:cNvPicPr>
+            <a:picLocks noChangeAspect="1" noChangeArrowheads="1"/>
+          </p:cNvPicPr>
+          <p:nvPr/>
+        </p:nvPicPr>
+        <p:blipFill>
+          <a:blip r:embed="rId2">
+            <a:extLst>
+              <a:ext uri="{28A0092B-C50C-407E-A947-70E740481C1C}">
+                <a14:useLocalDpi xmlns:a14="http://schemas.microsoft.com/office/drawing/2010/main" val="0"/>
+              </a:ext>
+            </a:extLst>
+          </a:blip>
+          <a:srcRect l="39520" t="56464" r="32584" b="4311"/>
+          <a:stretch>
+            <a:fillRect/>
+          </a:stretch>
+        </p:blipFill>
+        <p:spPr bwMode="auto">
+          <a:xfrm rot="10800000">
+            <a:off x="413238" y="2487246"/>
+            <a:ext cx="1606550" cy="1568450"/>
+          </a:xfrm>
+          <a:prstGeom prst="rect">
+            <a:avLst/>
+          </a:prstGeom>
+          <a:noFill/>
+          <a:extLst>
+            <a:ext uri="{909E8E84-426E-40DD-AFC4-6F175D3DCCD1}">
+              <a14:hiddenFill xmlns:a14="http://schemas.microsoft.com/office/drawing/2010/main">
+                <a:solidFill>
+                  <a:srgbClr val="FFFFFF"/>
+                </a:solidFill>
+              </a14:hiddenFill>
+            </a:ext>
+          </a:extLst>
+        </p:spPr>
+      </p:pic>
+      <p:pic>
+        <p:nvPicPr>
+          <p:cNvPr id="2051" name="Picture 3"/>
+          <p:cNvPicPr>
+            <a:picLocks noChangeAspect="1" noChangeArrowheads="1"/>
+          </p:cNvPicPr>
+          <p:nvPr/>
+        </p:nvPicPr>
+        <p:blipFill>
+          <a:blip r:embed="rId2">
+            <a:extLst>
+              <a:ext uri="{28A0092B-C50C-407E-A947-70E740481C1C}">
+                <a14:useLocalDpi xmlns:a14="http://schemas.microsoft.com/office/drawing/2010/main" val="0"/>
+              </a:ext>
+            </a:extLst>
+          </a:blip>
+          <a:srcRect l="67863" t="4256" r="4018" b="56396"/>
+          <a:stretch>
+            <a:fillRect/>
+          </a:stretch>
+        </p:blipFill>
+        <p:spPr bwMode="auto">
+          <a:xfrm rot="10800000">
+            <a:off x="2505808" y="2487247"/>
+            <a:ext cx="1631950" cy="1587500"/>
+          </a:xfrm>
+          <a:prstGeom prst="rect">
+            <a:avLst/>
+          </a:prstGeom>
+          <a:noFill/>
+          <a:extLst>
+            <a:ext uri="{909E8E84-426E-40DD-AFC4-6F175D3DCCD1}">
+              <a14:hiddenFill xmlns:a14="http://schemas.microsoft.com/office/drawing/2010/main">
+                <a:solidFill>
+                  <a:srgbClr val="FFFFFF"/>
+                </a:solidFill>
+              </a14:hiddenFill>
+            </a:ext>
+          </a:extLst>
+        </p:spPr>
+      </p:pic>
+      <p:pic>
+        <p:nvPicPr>
+          <p:cNvPr id="2050" name="Picture 2"/>
+          <p:cNvPicPr>
+            <a:picLocks noChangeAspect="1" noChangeArrowheads="1"/>
+          </p:cNvPicPr>
+          <p:nvPr/>
+        </p:nvPicPr>
+        <p:blipFill>
+          <a:blip r:embed="rId2">
+            <a:extLst>
+              <a:ext uri="{28A0092B-C50C-407E-A947-70E740481C1C}">
+                <a14:useLocalDpi xmlns:a14="http://schemas.microsoft.com/office/drawing/2010/main" val="0"/>
+              </a:ext>
+            </a:extLst>
+          </a:blip>
+          <a:srcRect l="36130" t="4028" r="36328" b="57039"/>
+          <a:stretch>
+            <a:fillRect/>
+          </a:stretch>
+        </p:blipFill>
+        <p:spPr bwMode="auto">
+          <a:xfrm rot="10800000">
+            <a:off x="4668715" y="2518996"/>
+            <a:ext cx="1581150" cy="1555750"/>
+          </a:xfrm>
+          <a:prstGeom prst="rect">
+            <a:avLst/>
+          </a:prstGeom>
+          <a:noFill/>
+          <a:extLst>
+            <a:ext uri="{909E8E84-426E-40DD-AFC4-6F175D3DCCD1}">
+              <a14:hiddenFill xmlns:a14="http://schemas.microsoft.com/office/drawing/2010/main">
+                <a:solidFill>
+                  <a:srgbClr val="FFFFFF"/>
+                </a:solidFill>
+              </a14:hiddenFill>
+            </a:ext>
+          </a:extLst>
+        </p:spPr>
+      </p:pic>
+      <p:pic>
+        <p:nvPicPr>
+          <p:cNvPr id="2049" name="Bild 1"/>
+          <p:cNvPicPr>
+            <a:picLocks noChangeAspect="1" noChangeArrowheads="1"/>
+          </p:cNvPicPr>
+          <p:nvPr/>
+        </p:nvPicPr>
+        <p:blipFill>
+          <a:blip r:embed="rId2">
+            <a:extLst>
+              <a:ext uri="{28A0092B-C50C-407E-A947-70E740481C1C}">
+                <a14:useLocalDpi xmlns:a14="http://schemas.microsoft.com/office/drawing/2010/main" val="0"/>
+              </a:ext>
+            </a:extLst>
+          </a:blip>
+          <a:srcRect l="4034" t="4477" r="68993" b="55969"/>
+          <a:stretch>
+            <a:fillRect/>
+          </a:stretch>
+        </p:blipFill>
+        <p:spPr bwMode="auto">
+          <a:xfrm rot="10800000">
+            <a:off x="6585438" y="2487246"/>
+            <a:ext cx="1536700" cy="1587500"/>
+          </a:xfrm>
+          <a:prstGeom prst="rect">
+            <a:avLst/>
+          </a:prstGeom>
+          <a:noFill/>
+          <a:extLst>
+            <a:ext uri="{909E8E84-426E-40DD-AFC4-6F175D3DCCD1}">
+              <a14:hiddenFill xmlns:a14="http://schemas.microsoft.com/office/drawing/2010/main">
+                <a:solidFill>
+                  <a:srgbClr val="FFFFFF"/>
+                </a:solidFill>
+              </a14:hiddenFill>
+            </a:ext>
+          </a:extLst>
+        </p:spPr>
+      </p:pic>
+      <p:sp>
+        <p:nvSpPr>
+          <p:cNvPr id="4" name="Rectangle 5"/>
+          <p:cNvSpPr>
+            <a:spLocks noChangeArrowheads="1"/>
+          </p:cNvSpPr>
+          <p:nvPr/>
+        </p:nvSpPr>
+        <p:spPr bwMode="auto">
+          <a:xfrm>
+            <a:off x="0" y="0"/>
+            <a:ext cx="9144000" cy="457200"/>
+          </a:xfrm>
+          <a:prstGeom prst="rect">
+            <a:avLst/>
+          </a:prstGeom>
+          <a:noFill/>
+          <a:ln>
+            <a:noFill/>
+          </a:ln>
+          <a:effectLst/>
+          <a:extLst>
+            <a:ext uri="{909E8E84-426E-40DD-AFC4-6F175D3DCCD1}">
+              <a14:hiddenFill xmlns:a14="http://schemas.microsoft.com/office/drawing/2010/main">
+                <a:solidFill>
+                  <a:schemeClr val="accent1"/>
+                </a:solidFill>
+              </a14:hiddenFill>
+            </a:ext>
+            <a:ext uri="{91240B29-F687-4F45-9708-019B960494DF}">
+              <a14:hiddenLine xmlns:a14="http://schemas.microsoft.com/office/drawing/2010/main" w="9525">
+                <a:solidFill>
+                  <a:schemeClr val="tx1"/>
+                </a:solidFill>
+                <a:miter lim="800000"/>
+                <a:headEnd/>
+                <a:tailEnd/>
+              </a14:hiddenLine>
+            </a:ext>
+            <a:ext uri="{AF507438-7753-43E0-B8FC-AC1667EBCBE1}">
+              <a14:hiddenEffects xmlns:a14="http://schemas.microsoft.com/office/drawing/2010/main">
+                <a:effectLst>
+                  <a:outerShdw dist="35921" dir="2700000" algn="ctr" rotWithShape="0">
+                    <a:schemeClr val="bg2"/>
+                  </a:outerShdw>
+                </a:effectLst>
+              </a14:hiddenEffects>
+            </a:ext>
+          </a:extLst>
+        </p:spPr>
+        <p:txBody>
+          <a:bodyPr vert="horz" wrap="none" lIns="91440" tIns="45720" rIns="91440" bIns="45720" numCol="1" anchor="ctr" anchorCtr="0" compatLnSpc="1">
+            <a:prstTxWarp prst="textNoShape">
+              <a:avLst/>
+            </a:prstTxWarp>
+            <a:spAutoFit/>
+          </a:bodyPr>
+          <a:lstStyle/>
+          <a:p>
+            <a:endParaRPr lang="de-CH"/>
+          </a:p>
+        </p:txBody>
+      </p:sp>
+      <p:sp>
+        <p:nvSpPr>
+          <p:cNvPr id="5" name="Rectangle 6"/>
+          <p:cNvSpPr>
+            <a:spLocks noChangeArrowheads="1"/>
+          </p:cNvSpPr>
+          <p:nvPr/>
+        </p:nvSpPr>
+        <p:spPr bwMode="auto">
+          <a:xfrm>
+            <a:off x="0" y="6756400"/>
+            <a:ext cx="9144000" cy="457200"/>
+          </a:xfrm>
+          <a:prstGeom prst="rect">
+            <a:avLst/>
+          </a:prstGeom>
+          <a:noFill/>
+          <a:ln>
+            <a:noFill/>
+          </a:ln>
+          <a:effectLst/>
+          <a:extLst>
+            <a:ext uri="{909E8E84-426E-40DD-AFC4-6F175D3DCCD1}">
+              <a14:hiddenFill xmlns:a14="http://schemas.microsoft.com/office/drawing/2010/main">
+                <a:solidFill>
+                  <a:schemeClr val="accent1"/>
+                </a:solidFill>
+              </a14:hiddenFill>
+            </a:ext>
+            <a:ext uri="{91240B29-F687-4F45-9708-019B960494DF}">
+              <a14:hiddenLine xmlns:a14="http://schemas.microsoft.com/office/drawing/2010/main" w="9525">
+                <a:solidFill>
+                  <a:schemeClr val="tx1"/>
+                </a:solidFill>
+                <a:miter lim="800000"/>
+                <a:headEnd/>
+                <a:tailEnd/>
+              </a14:hiddenLine>
+            </a:ext>
+            <a:ext uri="{AF507438-7753-43E0-B8FC-AC1667EBCBE1}">
+              <a14:hiddenEffects xmlns:a14="http://schemas.microsoft.com/office/drawing/2010/main">
+                <a:effectLst>
+                  <a:outerShdw dist="35921" dir="2700000" algn="ctr" rotWithShape="0">
+                    <a:schemeClr val="bg2"/>
+                  </a:outerShdw>
+                </a:effectLst>
+              </a14:hiddenEffects>
+            </a:ext>
+          </a:extLst>
+        </p:spPr>
+        <p:txBody>
+          <a:bodyPr vert="horz" wrap="none" lIns="91440" tIns="45720" rIns="91440" bIns="45720" numCol="1" anchor="ctr" anchorCtr="0" compatLnSpc="1">
+            <a:prstTxWarp prst="textNoShape">
+              <a:avLst/>
+            </a:prstTxWarp>
+            <a:spAutoFit/>
+          </a:bodyPr>
+          <a:lstStyle/>
+          <a:p>
+            <a:pPr marL="0" marR="0" lvl="0" indent="0" algn="l" defTabSz="914400" rtl="0" eaLnBrk="1" fontAlgn="base" latinLnBrk="0" hangingPunct="1">
+              <a:lnSpc>
+                <a:spcPct val="100000"/>
+              </a:lnSpc>
+              <a:spcBef>
+                <a:spcPct val="0"/>
+              </a:spcBef>
+              <a:spcAft>
+                <a:spcPct val="0"/>
+              </a:spcAft>
+              <a:buClrTx/>
+              <a:buSzTx/>
+              <a:buFontTx/>
+              <a:buNone/>
+              <a:tabLst/>
+            </a:pPr>
+            <a:endParaRPr kumimoji="0" lang="en-US" altLang="en-US" sz="1800" b="0" i="0" u="none" strike="noStrike" cap="none" normalizeH="0" baseline="0" smtClean="0">
+              <a:ln>
+                <a:noFill/>
+              </a:ln>
+              <a:solidFill>
+                <a:schemeClr val="tx1"/>
+              </a:solidFill>
+              <a:effectLst/>
+              <a:latin typeface="Arial" pitchFamily="34" charset="0"/>
+              <a:cs typeface="Arial" pitchFamily="34" charset="0"/>
+            </a:endParaRPr>
           </a:p>
         </p:txBody>
       </p:sp>
     </p:spTree>
     <p:extLst>
       <p:ext uri="{BB962C8B-B14F-4D97-AF65-F5344CB8AC3E}">
-        <p14:creationId xmlns:p14="http://schemas.microsoft.com/office/powerpoint/2010/main" val="1251349615"/>
+        <p14:creationId xmlns:p14="http://schemas.microsoft.com/office/powerpoint/2010/main" val="2669747725"/>
       </p:ext>
     </p:extLst>
   </p:cSld>
   <p:clrMapOvr>
     <a:masterClrMapping/>
   </p:clrMapOvr>
-  <p:timing>
-    <p:tnLst>
-      <p:par>
-        <p:cTn id="1" dur="indefinite" restart="never" nodeType="tmRoot"/>
-      </p:par>
-    </p:tnLst>
-  </p:timing>
 </p:sld>
 </file>
 
@@ -8471,8 +9126,8 @@
           <a:lstStyle/>
           <a:p>
             <a:r>
-              <a:rPr lang="de-CH" dirty="0" err="1" smtClean="0"/>
-              <a:t>Valitation</a:t>
+              <a:rPr lang="de-CH" dirty="0" smtClean="0"/>
+              <a:t>Prototype</a:t>
             </a:r>
             <a:endParaRPr lang="de-CH" dirty="0"/>
           </a:p>
@@ -8481,7 +9136,7 @@
     </p:spTree>
     <p:extLst>
       <p:ext uri="{BB962C8B-B14F-4D97-AF65-F5344CB8AC3E}">
-        <p14:creationId xmlns:p14="http://schemas.microsoft.com/office/powerpoint/2010/main" val="605634403"/>
+        <p14:creationId xmlns:p14="http://schemas.microsoft.com/office/powerpoint/2010/main" val="1251349615"/>
       </p:ext>
     </p:extLst>
   </p:cSld>
@@ -8517,7 +9172,26 @@
       </p:grpSpPr>
       <p:sp>
         <p:nvSpPr>
-          <p:cNvPr id="2" name="Titel 1"/>
+          <p:cNvPr id="2" name="Inhaltsplatzhalter 1"/>
+          <p:cNvSpPr>
+            <a:spLocks noGrp="1"/>
+          </p:cNvSpPr>
+          <p:nvPr>
+            <p:ph sz="half" idx="1"/>
+          </p:nvPr>
+        </p:nvSpPr>
+        <p:spPr/>
+        <p:txBody>
+          <a:bodyPr/>
+          <a:lstStyle/>
+          <a:p>
+            <a:endParaRPr lang="de-CH"/>
+          </a:p>
+        </p:txBody>
+      </p:sp>
+      <p:sp>
+        <p:nvSpPr>
+          <p:cNvPr id="3" name="Titel 2"/>
           <p:cNvSpPr>
             <a:spLocks noGrp="1"/>
           </p:cNvSpPr>
@@ -8531,8 +9205,8 @@
           <a:lstStyle/>
           <a:p>
             <a:r>
-              <a:rPr lang="de-DE" dirty="0"/>
-              <a:t>Herzlichen Dank!</a:t>
+              <a:rPr lang="de-CH" dirty="0" err="1" smtClean="0"/>
+              <a:t>Valitation</a:t>
             </a:r>
             <a:endParaRPr lang="de-CH" dirty="0"/>
           </a:p>
@@ -8541,7 +9215,7 @@
     </p:spTree>
     <p:extLst>
       <p:ext uri="{BB962C8B-B14F-4D97-AF65-F5344CB8AC3E}">
-        <p14:creationId xmlns:p14="http://schemas.microsoft.com/office/powerpoint/2010/main" val="1252526614"/>
+        <p14:creationId xmlns:p14="http://schemas.microsoft.com/office/powerpoint/2010/main" val="605634403"/>
       </p:ext>
     </p:extLst>
   </p:cSld>
@@ -9389,6 +10063,23 @@
 </file>
 
 <file path=customXml/item1.xml><?xml version="1.0" encoding="utf-8"?>
+<p:properties xmlns:p="http://schemas.microsoft.com/office/2006/metadata/properties" xmlns:xsi="http://www.w3.org/2001/XMLSchema-instance">
+  <documentManagement>
+    <AVMTitle xmlns="5091c847-84be-4f4f-b16c-c018ad2ca66b">Präsentation BFH_2013</AVMTitle>
+  </documentManagement>
+</p:properties>
+</file>
+
+<file path=customXml/item2.xml><?xml version="1.0" encoding="utf-8"?>
+<?mso-contentType ?>
+<FormTemplates xmlns="http://schemas.microsoft.com/sharepoint/v3/contenttype/forms">
+  <Display>DocumentLibraryForm</Display>
+  <Edit>DocumentLibraryForm</Edit>
+  <New>DocumentLibraryForm</New>
+</FormTemplates>
+</file>
+
+<file path=customXml/item3.xml><?xml version="1.0" encoding="utf-8"?>
 <ct:contentTypeSchema xmlns:ct="http://schemas.microsoft.com/office/2006/metadata/contentType" xmlns:ma="http://schemas.microsoft.com/office/2006/metadata/properties/metaAttributes" ct:_="" ma:_="" ma:contentTypeName="Dokument" ma:contentTypeID="0x010100EBE3A9EFF36793468C03E2811ACE2A2B" ma:contentTypeVersion="1" ma:contentTypeDescription="Ein neues Dokument erstellen." ma:contentTypeScope="" ma:versionID="e65be32cb1bfff77fc8c9c09bf542651">
   <xsd:schema xmlns:xsd="http://www.w3.org/2001/XMLSchema" xmlns:p="http://schemas.microsoft.com/office/2006/metadata/properties" xmlns:ns2="5091c847-84be-4f4f-b16c-c018ad2ca66b" targetNamespace="http://schemas.microsoft.com/office/2006/metadata/properties" ma:root="true" ma:fieldsID="7636c84aed5b7d09a166fcef888725d4" ns2:_="">
     <xsd:import namespace="5091c847-84be-4f4f-b16c-c018ad2ca66b"/>
@@ -9448,24 +10139,30 @@
 </ct:contentTypeSchema>
 </file>
 
-<file path=customXml/item2.xml><?xml version="1.0" encoding="utf-8"?>
-<?mso-contentType ?>
-<FormTemplates xmlns="http://schemas.microsoft.com/sharepoint/v3/contenttype/forms">
-  <Display>DocumentLibraryForm</Display>
-  <Edit>DocumentLibraryForm</Edit>
-  <New>DocumentLibraryForm</New>
-</FormTemplates>
+<file path=customXml/itemProps1.xml><?xml version="1.0" encoding="utf-8"?>
+<ds:datastoreItem xmlns:ds="http://schemas.openxmlformats.org/officeDocument/2006/customXml" ds:itemID="{32991507-CB83-4F49-BAFB-D322B1D04098}">
+  <ds:schemaRefs>
+    <ds:schemaRef ds:uri="http://purl.org/dc/terms/"/>
+    <ds:schemaRef ds:uri="http://schemas.openxmlformats.org/package/2006/metadata/core-properties"/>
+    <ds:schemaRef ds:uri="http://schemas.microsoft.com/office/2006/documentManagement/types"/>
+    <ds:schemaRef ds:uri="5091c847-84be-4f4f-b16c-c018ad2ca66b"/>
+    <ds:schemaRef ds:uri="http://purl.org/dc/elements/1.1/"/>
+    <ds:schemaRef ds:uri="http://schemas.microsoft.com/office/2006/metadata/properties"/>
+    <ds:schemaRef ds:uri="http://www.w3.org/XML/1998/namespace"/>
+    <ds:schemaRef ds:uri="http://purl.org/dc/dcmitype/"/>
+  </ds:schemaRefs>
+</ds:datastoreItem>
 </file>
 
-<file path=customXml/item3.xml><?xml version="1.0" encoding="utf-8"?>
-<p:properties xmlns:p="http://schemas.microsoft.com/office/2006/metadata/properties" xmlns:xsi="http://www.w3.org/2001/XMLSchema-instance">
-  <documentManagement>
-    <AVMTitle xmlns="5091c847-84be-4f4f-b16c-c018ad2ca66b">Präsentation BFH_2013</AVMTitle>
-  </documentManagement>
-</p:properties>
+<file path=customXml/itemProps2.xml><?xml version="1.0" encoding="utf-8"?>
+<ds:datastoreItem xmlns:ds="http://schemas.openxmlformats.org/officeDocument/2006/customXml" ds:itemID="{1851D33F-E468-417B-A30C-509B68D2BD09}">
+  <ds:schemaRefs>
+    <ds:schemaRef ds:uri="http://schemas.microsoft.com/sharepoint/v3/contenttype/forms"/>
+  </ds:schemaRefs>
+</ds:datastoreItem>
 </file>
 
-<file path=customXml/itemProps1.xml><?xml version="1.0" encoding="utf-8"?>
+<file path=customXml/itemProps3.xml><?xml version="1.0" encoding="utf-8"?>
 <ds:datastoreItem xmlns:ds="http://schemas.openxmlformats.org/officeDocument/2006/customXml" ds:itemID="{15287BEA-F3FF-4B87-929B-5D0092183197}">
   <ds:schemaRefs>
     <ds:schemaRef ds:uri="http://schemas.microsoft.com/office/2006/metadata/contentType"/>
@@ -9480,27 +10177,4 @@
     <ds:schemaRef ds:uri="http://schemas.microsoft.com/office/internal/2005/internalDocumentation"/>
   </ds:schemaRefs>
 </ds:datastoreItem>
-</file>
-
-<file path=customXml/itemProps2.xml><?xml version="1.0" encoding="utf-8"?>
-<ds:datastoreItem xmlns:ds="http://schemas.openxmlformats.org/officeDocument/2006/customXml" ds:itemID="{1851D33F-E468-417B-A30C-509B68D2BD09}">
-  <ds:schemaRefs>
-    <ds:schemaRef ds:uri="http://schemas.microsoft.com/sharepoint/v3/contenttype/forms"/>
-  </ds:schemaRefs>
-</ds:datastoreItem>
-</file>
-
-<file path=customXml/itemProps3.xml><?xml version="1.0" encoding="utf-8"?>
-<ds:datastoreItem xmlns:ds="http://schemas.openxmlformats.org/officeDocument/2006/customXml" ds:itemID="{32991507-CB83-4F49-BAFB-D322B1D04098}">
-  <ds:schemaRefs>
-    <ds:schemaRef ds:uri="http://purl.org/dc/terms/"/>
-    <ds:schemaRef ds:uri="http://schemas.openxmlformats.org/package/2006/metadata/core-properties"/>
-    <ds:schemaRef ds:uri="http://schemas.microsoft.com/office/2006/documentManagement/types"/>
-    <ds:schemaRef ds:uri="5091c847-84be-4f4f-b16c-c018ad2ca66b"/>
-    <ds:schemaRef ds:uri="http://purl.org/dc/elements/1.1/"/>
-    <ds:schemaRef ds:uri="http://schemas.microsoft.com/office/2006/metadata/properties"/>
-    <ds:schemaRef ds:uri="http://www.w3.org/XML/1998/namespace"/>
-    <ds:schemaRef ds:uri="http://purl.org/dc/dcmitype/"/>
-  </ds:schemaRefs>
-</ds:datastoreItem>
 </file>
</xml_diff>

<commit_message>
New version of the ppp. Still missing: "User"
</commit_message>
<xml_diff>
--- a/doc/Task03/Task3.pptx
+++ b/doc/Task03/Task3.pptx
@@ -5,10 +5,10 @@
     <p:sldMasterId id="2147483669" r:id="rId4"/>
   </p:sldMasterIdLst>
   <p:notesMasterIdLst>
-    <p:notesMasterId r:id="rId15"/>
+    <p:notesMasterId r:id="rId17"/>
   </p:notesMasterIdLst>
   <p:handoutMasterIdLst>
-    <p:handoutMasterId r:id="rId16"/>
+    <p:handoutMasterId r:id="rId18"/>
   </p:handoutMasterIdLst>
   <p:sldIdLst>
     <p:sldId id="259" r:id="rId5"/>
@@ -16,11 +16,13 @@
     <p:sldId id="306" r:id="rId7"/>
     <p:sldId id="307" r:id="rId8"/>
     <p:sldId id="308" r:id="rId9"/>
-    <p:sldId id="309" r:id="rId10"/>
+    <p:sldId id="314" r:id="rId10"/>
     <p:sldId id="312" r:id="rId11"/>
-    <p:sldId id="310" r:id="rId12"/>
-    <p:sldId id="311" r:id="rId13"/>
-    <p:sldId id="305" r:id="rId14"/>
+    <p:sldId id="309" r:id="rId12"/>
+    <p:sldId id="310" r:id="rId13"/>
+    <p:sldId id="313" r:id="rId14"/>
+    <p:sldId id="311" r:id="rId15"/>
+    <p:sldId id="305" r:id="rId16"/>
   </p:sldIdLst>
   <p:sldSz cx="9144000" cy="6858000" type="screen4x3"/>
   <p:notesSz cx="6669088" cy="9926638"/>
@@ -151,7 +153,7 @@
   </p:defaultTextStyle>
   <p:extLst>
     <p:ext uri="{EFAFB233-063F-42B5-8137-9DF3F51BA10A}">
-      <p15:sldGuideLst xmlns:p15="http://schemas.microsoft.com/office/powerpoint/2012/main">
+      <p15:sldGuideLst xmlns="" xmlns:p15="http://schemas.microsoft.com/office/powerpoint/2012/main">
         <p15:guide id="1" orient="horz" pos="2160">
           <p15:clr>
             <a:srgbClr val="A4A3A4"/>
@@ -165,7 +167,7 @@
       </p15:sldGuideLst>
     </p:ext>
     <p:ext uri="{2D200454-40CA-4A62-9FC3-DE9A4176ACB9}">
-      <p15:notesGuideLst xmlns:p15="http://schemas.microsoft.com/office/powerpoint/2012/main">
+      <p15:notesGuideLst xmlns="" xmlns:p15="http://schemas.microsoft.com/office/powerpoint/2012/main">
         <p15:guide id="1" orient="horz" pos="3127">
           <p15:clr>
             <a:srgbClr val="A4A3A4"/>
@@ -1096,10 +1098,10 @@
           <p:nvPr/>
         </p:nvPicPr>
         <p:blipFill>
-          <a:blip r:embed="rId2">
+          <a:blip r:embed="rId2" cstate="print">
             <a:extLst>
               <a:ext uri="{28A0092B-C50C-407E-A947-70E740481C1C}">
-                <a14:useLocalDpi xmlns:a14="http://schemas.microsoft.com/office/drawing/2010/main" val="0"/>
+                <a14:useLocalDpi xmlns:a14="http://schemas.microsoft.com/office/drawing/2010/main"/>
               </a:ext>
             </a:extLst>
           </a:blip>
@@ -2836,10 +2838,10 @@
           <p:nvPr/>
         </p:nvPicPr>
         <p:blipFill>
-          <a:blip r:embed="rId2">
+          <a:blip r:embed="rId2" cstate="print">
             <a:extLst>
               <a:ext uri="{28A0092B-C50C-407E-A947-70E740481C1C}">
-                <a14:useLocalDpi xmlns:a14="http://schemas.microsoft.com/office/drawing/2010/main" val="0"/>
+                <a14:useLocalDpi xmlns:a14="http://schemas.microsoft.com/office/drawing/2010/main"/>
               </a:ext>
             </a:extLst>
           </a:blip>
@@ -7220,6 +7222,274 @@
       </p:grpSpPr>
       <p:sp>
         <p:nvSpPr>
+          <p:cNvPr id="2" name="Inhaltsplatzhalter 1"/>
+          <p:cNvSpPr>
+            <a:spLocks noGrp="1"/>
+          </p:cNvSpPr>
+          <p:nvPr>
+            <p:ph sz="half" idx="1"/>
+          </p:nvPr>
+        </p:nvSpPr>
+        <p:spPr/>
+        <p:txBody>
+          <a:bodyPr/>
+          <a:lstStyle/>
+          <a:p>
+            <a:endParaRPr lang="de-CH"/>
+          </a:p>
+        </p:txBody>
+      </p:sp>
+      <p:sp>
+        <p:nvSpPr>
+          <p:cNvPr id="3" name="Titel 2"/>
+          <p:cNvSpPr>
+            <a:spLocks noGrp="1"/>
+          </p:cNvSpPr>
+          <p:nvPr>
+            <p:ph type="ctrTitle"/>
+          </p:nvPr>
+        </p:nvSpPr>
+        <p:spPr/>
+        <p:txBody>
+          <a:bodyPr/>
+          <a:lstStyle/>
+          <a:p>
+            <a:r>
+              <a:rPr lang="de-CH" dirty="0" smtClean="0"/>
+              <a:t>Prototype</a:t>
+            </a:r>
+            <a:endParaRPr lang="de-CH" dirty="0"/>
+          </a:p>
+        </p:txBody>
+      </p:sp>
+      <p:pic>
+        <p:nvPicPr>
+          <p:cNvPr id="4" name="Grafik 3"/>
+          <p:cNvPicPr/>
+          <p:nvPr/>
+        </p:nvPicPr>
+        <p:blipFill>
+          <a:blip r:embed="rId2">
+            <a:extLst>
+              <a:ext uri="{28A0092B-C50C-407E-A947-70E740481C1C}">
+                <a14:useLocalDpi xmlns:a14="http://schemas.microsoft.com/office/drawing/2010/main"/>
+              </a:ext>
+            </a:extLst>
+          </a:blip>
+          <a:srcRect/>
+          <a:stretch>
+            <a:fillRect/>
+          </a:stretch>
+        </p:blipFill>
+        <p:spPr bwMode="auto">
+          <a:xfrm>
+            <a:off x="1786467" y="1627749"/>
+            <a:ext cx="2308860" cy="3672840"/>
+          </a:xfrm>
+          <a:prstGeom prst="rect">
+            <a:avLst/>
+          </a:prstGeom>
+          <a:noFill/>
+          <a:ln>
+            <a:noFill/>
+          </a:ln>
+        </p:spPr>
+      </p:pic>
+      <p:pic>
+        <p:nvPicPr>
+          <p:cNvPr id="6" name="Grafik 5"/>
+          <p:cNvPicPr/>
+          <p:nvPr/>
+        </p:nvPicPr>
+        <p:blipFill rotWithShape="1">
+          <a:blip r:embed="rId3" cstate="print">
+            <a:extLst>
+              <a:ext uri="{28A0092B-C50C-407E-A947-70E740481C1C}">
+                <a14:useLocalDpi xmlns:a14="http://schemas.microsoft.com/office/drawing/2010/main"/>
+              </a:ext>
+            </a:extLst>
+          </a:blip>
+          <a:srcRect b="6458"/>
+          <a:stretch/>
+        </p:blipFill>
+        <p:spPr bwMode="auto">
+          <a:xfrm>
+            <a:off x="5292683" y="1627749"/>
+            <a:ext cx="2339340" cy="3642360"/>
+          </a:xfrm>
+          <a:prstGeom prst="rect">
+            <a:avLst/>
+          </a:prstGeom>
+          <a:noFill/>
+          <a:ln>
+            <a:noFill/>
+          </a:ln>
+          <a:extLst>
+            <a:ext uri="{53640926-AAD7-44D8-BBD7-CCE9431645EC}">
+              <a14:shadowObscured xmlns:a14="http://schemas.microsoft.com/office/drawing/2010/main"/>
+            </a:ext>
+          </a:extLst>
+        </p:spPr>
+      </p:pic>
+    </p:spTree>
+    <p:extLst>
+      <p:ext uri="{BB962C8B-B14F-4D97-AF65-F5344CB8AC3E}">
+        <p14:creationId xmlns:p14="http://schemas.microsoft.com/office/powerpoint/2010/main" val="2741672882"/>
+      </p:ext>
+    </p:extLst>
+  </p:cSld>
+  <p:clrMapOvr>
+    <a:masterClrMapping/>
+  </p:clrMapOvr>
+  <p:timing>
+    <p:tnLst>
+      <p:par>
+        <p:cTn id="1" dur="indefinite" restart="never" nodeType="tmRoot"/>
+      </p:par>
+    </p:tnLst>
+  </p:timing>
+</p:sld>
+</file>
+
+<file path=ppt/slides/slide11.xml><?xml version="1.0" encoding="utf-8"?>
+<p:sld xmlns:a="http://schemas.openxmlformats.org/drawingml/2006/main" xmlns:r="http://schemas.openxmlformats.org/officeDocument/2006/relationships" xmlns:p="http://schemas.openxmlformats.org/presentationml/2006/main">
+  <p:cSld>
+    <p:spTree>
+      <p:nvGrpSpPr>
+        <p:cNvPr id="1" name=""/>
+        <p:cNvGrpSpPr/>
+        <p:nvPr/>
+      </p:nvGrpSpPr>
+      <p:grpSpPr>
+        <a:xfrm>
+          <a:off x="0" y="0"/>
+          <a:ext cx="0" cy="0"/>
+          <a:chOff x="0" y="0"/>
+          <a:chExt cx="0" cy="0"/>
+        </a:xfrm>
+      </p:grpSpPr>
+      <p:sp>
+        <p:nvSpPr>
+          <p:cNvPr id="2" name="Inhaltsplatzhalter 1"/>
+          <p:cNvSpPr>
+            <a:spLocks noGrp="1"/>
+          </p:cNvSpPr>
+          <p:nvPr>
+            <p:ph sz="half" idx="1"/>
+          </p:nvPr>
+        </p:nvSpPr>
+        <p:spPr/>
+        <p:txBody>
+          <a:bodyPr/>
+          <a:lstStyle/>
+          <a:p>
+            <a:endParaRPr lang="de-CH" dirty="0"/>
+          </a:p>
+        </p:txBody>
+      </p:sp>
+      <p:sp>
+        <p:nvSpPr>
+          <p:cNvPr id="3" name="Titel 2"/>
+          <p:cNvSpPr>
+            <a:spLocks noGrp="1"/>
+          </p:cNvSpPr>
+          <p:nvPr>
+            <p:ph type="ctrTitle"/>
+          </p:nvPr>
+        </p:nvSpPr>
+        <p:spPr/>
+        <p:txBody>
+          <a:bodyPr/>
+          <a:lstStyle/>
+          <a:p>
+            <a:r>
+              <a:rPr lang="de-CH" dirty="0" err="1" smtClean="0"/>
+              <a:t>Valitation</a:t>
+            </a:r>
+            <a:endParaRPr lang="de-CH" dirty="0"/>
+          </a:p>
+        </p:txBody>
+      </p:sp>
+      <p:pic>
+        <p:nvPicPr>
+          <p:cNvPr id="5122" name="Picture 2" descr="http://www.health.gov.fj/fijindr/images/attention.png"/>
+          <p:cNvPicPr>
+            <a:picLocks noChangeAspect="1" noChangeArrowheads="1"/>
+          </p:cNvPicPr>
+          <p:nvPr/>
+        </p:nvPicPr>
+        <p:blipFill>
+          <a:blip r:embed="rId2" cstate="print">
+            <a:extLst>
+              <a:ext uri="{28A0092B-C50C-407E-A947-70E740481C1C}">
+                <a14:useLocalDpi xmlns:a14="http://schemas.microsoft.com/office/drawing/2010/main"/>
+              </a:ext>
+            </a:extLst>
+          </a:blip>
+          <a:srcRect/>
+          <a:stretch>
+            <a:fillRect/>
+          </a:stretch>
+        </p:blipFill>
+        <p:spPr bwMode="auto">
+          <a:xfrm>
+            <a:off x="6928497" y="4510240"/>
+            <a:ext cx="1869922" cy="1686047"/>
+          </a:xfrm>
+          <a:prstGeom prst="rect">
+            <a:avLst/>
+          </a:prstGeom>
+          <a:noFill/>
+          <a:extLst>
+            <a:ext uri="{909E8E84-426E-40DD-AFC4-6F175D3DCCD1}">
+              <a14:hiddenFill xmlns:a14="http://schemas.microsoft.com/office/drawing/2010/main">
+                <a:solidFill>
+                  <a:srgbClr val="FFFFFF"/>
+                </a:solidFill>
+              </a14:hiddenFill>
+            </a:ext>
+          </a:extLst>
+        </p:spPr>
+      </p:pic>
+    </p:spTree>
+    <p:extLst>
+      <p:ext uri="{BB962C8B-B14F-4D97-AF65-F5344CB8AC3E}">
+        <p14:creationId xmlns:p14="http://schemas.microsoft.com/office/powerpoint/2010/main" val="605634403"/>
+      </p:ext>
+    </p:extLst>
+  </p:cSld>
+  <p:clrMapOvr>
+    <a:masterClrMapping/>
+  </p:clrMapOvr>
+  <p:timing>
+    <p:tnLst>
+      <p:par>
+        <p:cTn id="1" dur="indefinite" restart="never" nodeType="tmRoot"/>
+      </p:par>
+    </p:tnLst>
+  </p:timing>
+</p:sld>
+</file>
+
+<file path=ppt/slides/slide12.xml><?xml version="1.0" encoding="utf-8"?>
+<p:sld xmlns:a="http://schemas.openxmlformats.org/drawingml/2006/main" xmlns:r="http://schemas.openxmlformats.org/officeDocument/2006/relationships" xmlns:p="http://schemas.openxmlformats.org/presentationml/2006/main">
+  <p:cSld>
+    <p:spTree>
+      <p:nvGrpSpPr>
+        <p:cNvPr id="1" name=""/>
+        <p:cNvGrpSpPr/>
+        <p:nvPr/>
+      </p:nvGrpSpPr>
+      <p:grpSpPr>
+        <a:xfrm>
+          <a:off x="0" y="0"/>
+          <a:ext cx="0" cy="0"/>
+          <a:chOff x="0" y="0"/>
+          <a:chExt cx="0" cy="0"/>
+        </a:xfrm>
+      </p:grpSpPr>
+      <p:sp>
+        <p:nvSpPr>
           <p:cNvPr id="2" name="Titel 1"/>
           <p:cNvSpPr>
             <a:spLocks noGrp="1"/>
@@ -7972,6 +8242,47 @@
           </a:p>
         </p:txBody>
       </p:sp>
+      <p:pic>
+        <p:nvPicPr>
+          <p:cNvPr id="3074" name="Picture 2" descr="http://www.bogenloewe.de/images/BO_60102_60104_Fita_Ringscheibe_40_80%20cm.jpg"/>
+          <p:cNvPicPr>
+            <a:picLocks noChangeAspect="1" noChangeArrowheads="1"/>
+          </p:cNvPicPr>
+          <p:nvPr/>
+        </p:nvPicPr>
+        <p:blipFill>
+          <a:blip r:embed="rId2" cstate="print">
+            <a:extLst>
+              <a:ext uri="{28A0092B-C50C-407E-A947-70E740481C1C}">
+                <a14:useLocalDpi xmlns:a14="http://schemas.microsoft.com/office/drawing/2010/main"/>
+              </a:ext>
+            </a:extLst>
+          </a:blip>
+          <a:srcRect/>
+          <a:stretch>
+            <a:fillRect/>
+          </a:stretch>
+        </p:blipFill>
+        <p:spPr bwMode="auto">
+          <a:xfrm>
+            <a:off x="6701110" y="4418039"/>
+            <a:ext cx="1827430" cy="1827430"/>
+          </a:xfrm>
+          <a:prstGeom prst="rect">
+            <a:avLst/>
+          </a:prstGeom>
+          <a:noFill/>
+          <a:extLst>
+            <a:ext uri="{909E8E84-426E-40DD-AFC4-6F175D3DCCD1}">
+              <a14:hiddenFill xmlns:a14="http://schemas.microsoft.com/office/drawing/2010/main">
+                <a:solidFill>
+                  <a:srgbClr val="FFFFFF"/>
+                </a:solidFill>
+              </a14:hiddenFill>
+            </a:ext>
+          </a:extLst>
+        </p:spPr>
+      </p:pic>
     </p:spTree>
     <p:extLst>
       <p:ext uri="{BB962C8B-B14F-4D97-AF65-F5344CB8AC3E}">
@@ -8204,7 +8515,7 @@
             <a:endParaRPr lang="en-GB" dirty="0"/>
           </a:p>
           <a:p>
-            <a:pPr lvl="0"/>
+            <a:pPr lvl="1"/>
             <a:r>
               <a:rPr lang="de-CH" dirty="0" smtClean="0"/>
               <a:t>Sozialarbeiter </a:t>
@@ -8216,7 +8527,7 @@
             <a:endParaRPr lang="en-GB" dirty="0"/>
           </a:p>
           <a:p>
-            <a:pPr lvl="0"/>
+            <a:pPr lvl="1"/>
             <a:r>
               <a:rPr lang="de-CH" dirty="0" smtClean="0"/>
               <a:t>Informationen </a:t>
@@ -8228,7 +8539,7 @@
             <a:endParaRPr lang="en-GB" dirty="0"/>
           </a:p>
           <a:p>
-            <a:pPr lvl="0"/>
+            <a:pPr lvl="1"/>
             <a:r>
               <a:rPr lang="de-CH" dirty="0"/>
               <a:t>Informationen zu Gespräch mit Patient speichern</a:t>
@@ -8247,7 +8558,7 @@
             <a:endParaRPr lang="en-GB" dirty="0"/>
           </a:p>
           <a:p>
-            <a:pPr lvl="0"/>
+            <a:pPr lvl="1"/>
             <a:r>
               <a:rPr lang="de-CH" dirty="0"/>
               <a:t>Übersicht im Kalender (Tages- &amp; Wochenansicht)</a:t>
@@ -8255,7 +8566,7 @@
             <a:endParaRPr lang="en-GB" dirty="0"/>
           </a:p>
           <a:p>
-            <a:pPr lvl="0"/>
+            <a:pPr lvl="1"/>
             <a:r>
               <a:rPr lang="de-CH" dirty="0"/>
               <a:t>Terminvereinbarung mit Patienten</a:t>
@@ -8263,7 +8574,7 @@
             <a:endParaRPr lang="en-GB" dirty="0"/>
           </a:p>
           <a:p>
-            <a:pPr lvl="0"/>
+            <a:pPr lvl="1"/>
             <a:r>
               <a:rPr lang="de-CH" dirty="0"/>
               <a:t>Patientenübersicht</a:t>
@@ -8271,7 +8582,7 @@
             <a:endParaRPr lang="en-GB" dirty="0"/>
           </a:p>
           <a:p>
-            <a:pPr lvl="0"/>
+            <a:pPr lvl="1"/>
             <a:r>
               <a:rPr lang="de-CH" dirty="0" smtClean="0"/>
               <a:t>Verlauf </a:t>
@@ -8283,7 +8594,7 @@
             <a:endParaRPr lang="en-GB" dirty="0"/>
           </a:p>
           <a:p>
-            <a:pPr lvl="0"/>
+            <a:pPr lvl="1"/>
             <a:r>
               <a:rPr lang="de-CH" dirty="0"/>
               <a:t>Ein- und Austrittsdatum Kliniken</a:t>
@@ -8291,7 +8602,7 @@
             <a:endParaRPr lang="en-GB" dirty="0"/>
           </a:p>
           <a:p>
-            <a:pPr lvl="0"/>
+            <a:pPr lvl="1"/>
             <a:r>
               <a:rPr lang="de-CH" dirty="0"/>
               <a:t>Datensicherheit</a:t>
@@ -8326,6 +8637,47 @@
           </a:p>
         </p:txBody>
       </p:sp>
+      <p:pic>
+        <p:nvPicPr>
+          <p:cNvPr id="4098" name="Picture 2" descr="http://www.clipartbest.com/cliparts/RcA/6Bp/RcA6Bpzpi.jpeg"/>
+          <p:cNvPicPr>
+            <a:picLocks noChangeAspect="1" noChangeArrowheads="1"/>
+          </p:cNvPicPr>
+          <p:nvPr/>
+        </p:nvPicPr>
+        <p:blipFill>
+          <a:blip r:embed="rId2">
+            <a:extLst>
+              <a:ext uri="{28A0092B-C50C-407E-A947-70E740481C1C}">
+                <a14:useLocalDpi xmlns:a14="http://schemas.microsoft.com/office/drawing/2010/main"/>
+              </a:ext>
+            </a:extLst>
+          </a:blip>
+          <a:srcRect/>
+          <a:stretch>
+            <a:fillRect/>
+          </a:stretch>
+        </p:blipFill>
+        <p:spPr bwMode="auto">
+          <a:xfrm>
+            <a:off x="6928881" y="4496246"/>
+            <a:ext cx="1867728" cy="1686578"/>
+          </a:xfrm>
+          <a:prstGeom prst="rect">
+            <a:avLst/>
+          </a:prstGeom>
+          <a:noFill/>
+          <a:extLst>
+            <a:ext uri="{909E8E84-426E-40DD-AFC4-6F175D3DCCD1}">
+              <a14:hiddenFill xmlns:a14="http://schemas.microsoft.com/office/drawing/2010/main">
+                <a:solidFill>
+                  <a:srgbClr val="FFFFFF"/>
+                </a:solidFill>
+              </a14:hiddenFill>
+            </a:ext>
+          </a:extLst>
+        </p:spPr>
+      </p:pic>
     </p:spTree>
     <p:extLst>
       <p:ext uri="{BB962C8B-B14F-4D97-AF65-F5344CB8AC3E}">
@@ -8378,19 +8730,6 @@
           <a:bodyPr/>
           <a:lstStyle/>
           <a:p>
-            <a:r>
-              <a:rPr lang="de-CH" dirty="0"/>
-              <a:t>Terminablauf mit einem Patienten im Büro des </a:t>
-            </a:r>
-            <a:r>
-              <a:rPr lang="de-CH" dirty="0" smtClean="0"/>
-              <a:t>Sozialarbeiter</a:t>
-            </a:r>
-          </a:p>
-          <a:p>
-            <a:pPr marL="0" indent="0">
-              <a:buNone/>
-            </a:pPr>
             <a:endParaRPr lang="de-CH" dirty="0"/>
           </a:p>
         </p:txBody>
@@ -8412,7 +8751,7 @@
           <a:p>
             <a:r>
               <a:rPr lang="de-CH" dirty="0" smtClean="0"/>
-              <a:t>Design</a:t>
+              <a:t>User</a:t>
             </a:r>
             <a:endParaRPr lang="de-CH" dirty="0"/>
           </a:p>
@@ -8420,7 +8759,7 @@
       </p:sp>
       <p:pic>
         <p:nvPicPr>
-          <p:cNvPr id="1029" name="Bild 16"/>
+          <p:cNvPr id="2050" name="Picture 2" descr="http://www.aliro-opens-doors.com/images/icon-glossary/user-placeholder-female.png"/>
           <p:cNvPicPr>
             <a:picLocks noChangeAspect="1" noChangeArrowheads="1"/>
           </p:cNvPicPr>
@@ -8430,7 +8769,7 @@
           <a:blip r:embed="rId2">
             <a:extLst>
               <a:ext uri="{28A0092B-C50C-407E-A947-70E740481C1C}">
-                <a14:useLocalDpi xmlns:a14="http://schemas.microsoft.com/office/drawing/2010/main" val="0"/>
+                <a14:useLocalDpi xmlns:a14="http://schemas.microsoft.com/office/drawing/2010/main"/>
               </a:ext>
             </a:extLst>
           </a:blip>
@@ -8440,9 +8779,9 @@
           </a:stretch>
         </p:blipFill>
         <p:spPr bwMode="auto">
-          <a:xfrm rot="-5400000">
-            <a:off x="1429726" y="1917944"/>
-            <a:ext cx="1841500" cy="1758950"/>
+          <a:xfrm>
+            <a:off x="6916860" y="4379424"/>
+            <a:ext cx="1219200" cy="1219201"/>
           </a:xfrm>
           <a:prstGeom prst="rect">
             <a:avLst/>
@@ -8459,237 +8798,10 @@
           </a:extLst>
         </p:spPr>
       </p:pic>
-      <p:pic>
-        <p:nvPicPr>
-          <p:cNvPr id="1028" name="Bild 17"/>
-          <p:cNvPicPr>
-            <a:picLocks noChangeAspect="1" noChangeArrowheads="1"/>
-          </p:cNvPicPr>
-          <p:nvPr/>
-        </p:nvPicPr>
-        <p:blipFill>
-          <a:blip r:embed="rId3">
-            <a:extLst>
-              <a:ext uri="{28A0092B-C50C-407E-A947-70E740481C1C}">
-                <a14:useLocalDpi xmlns:a14="http://schemas.microsoft.com/office/drawing/2010/main" val="0"/>
-              </a:ext>
-            </a:extLst>
-          </a:blip>
-          <a:srcRect/>
-          <a:stretch>
-            <a:fillRect/>
-          </a:stretch>
-        </p:blipFill>
-        <p:spPr bwMode="auto">
-          <a:xfrm rot="-5400000">
-            <a:off x="3332284" y="2203694"/>
-            <a:ext cx="1835150" cy="1155700"/>
-          </a:xfrm>
-          <a:prstGeom prst="rect">
-            <a:avLst/>
-          </a:prstGeom>
-          <a:noFill/>
-          <a:extLst>
-            <a:ext uri="{909E8E84-426E-40DD-AFC4-6F175D3DCCD1}">
-              <a14:hiddenFill xmlns:a14="http://schemas.microsoft.com/office/drawing/2010/main">
-                <a:solidFill>
-                  <a:srgbClr val="FFFFFF"/>
-                </a:solidFill>
-              </a14:hiddenFill>
-            </a:ext>
-          </a:extLst>
-        </p:spPr>
-      </p:pic>
-      <p:pic>
-        <p:nvPicPr>
-          <p:cNvPr id="1027" name="Bild 18"/>
-          <p:cNvPicPr>
-            <a:picLocks noChangeAspect="1" noChangeArrowheads="1"/>
-          </p:cNvPicPr>
-          <p:nvPr/>
-        </p:nvPicPr>
-        <p:blipFill>
-          <a:blip r:embed="rId4">
-            <a:extLst>
-              <a:ext uri="{28A0092B-C50C-407E-A947-70E740481C1C}">
-                <a14:useLocalDpi xmlns:a14="http://schemas.microsoft.com/office/drawing/2010/main" val="0"/>
-              </a:ext>
-            </a:extLst>
-          </a:blip>
-          <a:srcRect/>
-          <a:stretch>
-            <a:fillRect/>
-          </a:stretch>
-        </p:blipFill>
-        <p:spPr bwMode="auto">
-          <a:xfrm rot="-5400000">
-            <a:off x="4970829" y="2235444"/>
-            <a:ext cx="1822450" cy="1079500"/>
-          </a:xfrm>
-          <a:prstGeom prst="rect">
-            <a:avLst/>
-          </a:prstGeom>
-          <a:noFill/>
-          <a:extLst>
-            <a:ext uri="{909E8E84-426E-40DD-AFC4-6F175D3DCCD1}">
-              <a14:hiddenFill xmlns:a14="http://schemas.microsoft.com/office/drawing/2010/main">
-                <a:solidFill>
-                  <a:srgbClr val="FFFFFF"/>
-                </a:solidFill>
-              </a14:hiddenFill>
-            </a:ext>
-          </a:extLst>
-        </p:spPr>
-      </p:pic>
-      <p:pic>
-        <p:nvPicPr>
-          <p:cNvPr id="1026" name="Bild 19"/>
-          <p:cNvPicPr>
-            <a:picLocks noChangeAspect="1" noChangeArrowheads="1"/>
-          </p:cNvPicPr>
-          <p:nvPr/>
-        </p:nvPicPr>
-        <p:blipFill>
-          <a:blip r:embed="rId5">
-            <a:extLst>
-              <a:ext uri="{28A0092B-C50C-407E-A947-70E740481C1C}">
-                <a14:useLocalDpi xmlns:a14="http://schemas.microsoft.com/office/drawing/2010/main" val="0"/>
-              </a:ext>
-            </a:extLst>
-          </a:blip>
-          <a:srcRect/>
-          <a:stretch>
-            <a:fillRect/>
-          </a:stretch>
-        </p:blipFill>
-        <p:spPr bwMode="auto">
-          <a:xfrm rot="-5400000">
-            <a:off x="1344001" y="4018084"/>
-            <a:ext cx="1682750" cy="1428750"/>
-          </a:xfrm>
-          <a:prstGeom prst="rect">
-            <a:avLst/>
-          </a:prstGeom>
-          <a:noFill/>
-          <a:extLst>
-            <a:ext uri="{909E8E84-426E-40DD-AFC4-6F175D3DCCD1}">
-              <a14:hiddenFill xmlns:a14="http://schemas.microsoft.com/office/drawing/2010/main">
-                <a:solidFill>
-                  <a:srgbClr val="FFFFFF"/>
-                </a:solidFill>
-              </a14:hiddenFill>
-            </a:ext>
-          </a:extLst>
-        </p:spPr>
-      </p:pic>
-      <p:pic>
-        <p:nvPicPr>
-          <p:cNvPr id="1025" name="Bild 20"/>
-          <p:cNvPicPr>
-            <a:picLocks noChangeAspect="1" noChangeArrowheads="1"/>
-          </p:cNvPicPr>
-          <p:nvPr/>
-        </p:nvPicPr>
-        <p:blipFill>
-          <a:blip r:embed="rId6">
-            <a:extLst>
-              <a:ext uri="{28A0092B-C50C-407E-A947-70E740481C1C}">
-                <a14:useLocalDpi xmlns:a14="http://schemas.microsoft.com/office/drawing/2010/main" val="0"/>
-              </a:ext>
-            </a:extLst>
-          </a:blip>
-          <a:srcRect/>
-          <a:stretch>
-            <a:fillRect/>
-          </a:stretch>
-        </p:blipFill>
-        <p:spPr bwMode="auto">
-          <a:xfrm rot="-5400000">
-            <a:off x="3402133" y="4030784"/>
-            <a:ext cx="1695450" cy="1403350"/>
-          </a:xfrm>
-          <a:prstGeom prst="rect">
-            <a:avLst/>
-          </a:prstGeom>
-          <a:noFill/>
-          <a:extLst>
-            <a:ext uri="{909E8E84-426E-40DD-AFC4-6F175D3DCCD1}">
-              <a14:hiddenFill xmlns:a14="http://schemas.microsoft.com/office/drawing/2010/main">
-                <a:solidFill>
-                  <a:srgbClr val="FFFFFF"/>
-                </a:solidFill>
-              </a14:hiddenFill>
-            </a:ext>
-          </a:extLst>
-        </p:spPr>
-      </p:pic>
-      <p:sp>
-        <p:nvSpPr>
-          <p:cNvPr id="4" name="Rectangle 6"/>
-          <p:cNvSpPr>
-            <a:spLocks noChangeArrowheads="1"/>
-          </p:cNvSpPr>
-          <p:nvPr/>
-        </p:nvSpPr>
-        <p:spPr bwMode="auto">
-          <a:xfrm>
-            <a:off x="0" y="0"/>
-            <a:ext cx="9144000" cy="457200"/>
-          </a:xfrm>
-          <a:prstGeom prst="rect">
-            <a:avLst/>
-          </a:prstGeom>
-          <a:noFill/>
-          <a:ln>
-            <a:noFill/>
-          </a:ln>
-          <a:effectLst/>
-          <a:extLst>
-            <a:ext uri="{909E8E84-426E-40DD-AFC4-6F175D3DCCD1}">
-              <a14:hiddenFill xmlns:a14="http://schemas.microsoft.com/office/drawing/2010/main">
-                <a:solidFill>
-                  <a:schemeClr val="accent1"/>
-                </a:solidFill>
-              </a14:hiddenFill>
-            </a:ext>
-            <a:ext uri="{91240B29-F687-4F45-9708-019B960494DF}">
-              <a14:hiddenLine xmlns:a14="http://schemas.microsoft.com/office/drawing/2010/main" w="9525">
-                <a:solidFill>
-                  <a:schemeClr val="tx1"/>
-                </a:solidFill>
-                <a:miter lim="800000"/>
-                <a:headEnd/>
-                <a:tailEnd/>
-              </a14:hiddenLine>
-            </a:ext>
-            <a:ext uri="{AF507438-7753-43E0-B8FC-AC1667EBCBE1}">
-              <a14:hiddenEffects xmlns:a14="http://schemas.microsoft.com/office/drawing/2010/main">
-                <a:effectLst>
-                  <a:outerShdw dist="35921" dir="2700000" algn="ctr" rotWithShape="0">
-                    <a:schemeClr val="bg2"/>
-                  </a:outerShdw>
-                </a:effectLst>
-              </a14:hiddenEffects>
-            </a:ext>
-          </a:extLst>
-        </p:spPr>
-        <p:txBody>
-          <a:bodyPr vert="horz" wrap="none" lIns="91440" tIns="45720" rIns="91440" bIns="45720" numCol="1" anchor="ctr" anchorCtr="0" compatLnSpc="1">
-            <a:prstTxWarp prst="textNoShape">
-              <a:avLst/>
-            </a:prstTxWarp>
-            <a:spAutoFit/>
-          </a:bodyPr>
-          <a:lstStyle/>
-          <a:p>
-            <a:endParaRPr lang="de-CH"/>
-          </a:p>
-        </p:txBody>
-      </p:sp>
     </p:spTree>
     <p:extLst>
       <p:ext uri="{BB962C8B-B14F-4D97-AF65-F5344CB8AC3E}">
-        <p14:creationId xmlns:p14="http://schemas.microsoft.com/office/powerpoint/2010/main" val="2772796197"/>
+        <p14:creationId xmlns:p14="http://schemas.microsoft.com/office/powerpoint/2010/main" val="2744848306"/>
       </p:ext>
     </p:extLst>
   </p:cSld>
@@ -8742,7 +8854,43 @@
               <a:rPr lang="de-CH" dirty="0" smtClean="0"/>
               <a:t>Termin mit einem Patienten vereinbaren</a:t>
             </a:r>
+          </a:p>
+          <a:p>
             <a:endParaRPr lang="de-CH" dirty="0"/>
+          </a:p>
+          <a:p>
+            <a:endParaRPr lang="de-CH" dirty="0" smtClean="0"/>
+          </a:p>
+          <a:p>
+            <a:endParaRPr lang="de-CH" dirty="0"/>
+          </a:p>
+          <a:p>
+            <a:endParaRPr lang="de-CH" dirty="0" smtClean="0"/>
+          </a:p>
+          <a:p>
+            <a:endParaRPr lang="de-CH" dirty="0"/>
+          </a:p>
+          <a:p>
+            <a:r>
+              <a:rPr lang="de-CH" dirty="0"/>
+              <a:t>Aufnahme eines neuen Patienten „on-</a:t>
+            </a:r>
+            <a:r>
+              <a:rPr lang="de-CH" dirty="0" err="1"/>
+              <a:t>the</a:t>
+            </a:r>
+            <a:r>
+              <a:rPr lang="de-CH" dirty="0"/>
+              <a:t>-</a:t>
+            </a:r>
+            <a:r>
+              <a:rPr lang="de-CH" dirty="0" err="1"/>
+              <a:t>fly</a:t>
+            </a:r>
+            <a:r>
+              <a:rPr lang="de-CH" dirty="0"/>
+              <a:t>“</a:t>
+            </a:r>
           </a:p>
         </p:txBody>
       </p:sp>
@@ -8778,10 +8926,11 @@
           <p:nvPr/>
         </p:nvPicPr>
         <p:blipFill>
-          <a:blip r:embed="rId2">
+          <a:blip r:embed="rId2" cstate="print">
+            <a:grayscl/>
             <a:extLst>
               <a:ext uri="{28A0092B-C50C-407E-A947-70E740481C1C}">
-                <a14:useLocalDpi xmlns:a14="http://schemas.microsoft.com/office/drawing/2010/main" val="0"/>
+                <a14:useLocalDpi xmlns:a14="http://schemas.microsoft.com/office/drawing/2010/main"/>
               </a:ext>
             </a:extLst>
           </a:blip>
@@ -8792,7 +8941,7 @@
         </p:blipFill>
         <p:spPr bwMode="auto">
           <a:xfrm rot="10800000">
-            <a:off x="413238" y="2487246"/>
+            <a:off x="413238" y="1598578"/>
             <a:ext cx="1606550" cy="1568450"/>
           </a:xfrm>
           <a:prstGeom prst="rect">
@@ -8819,10 +8968,11 @@
           <p:nvPr/>
         </p:nvPicPr>
         <p:blipFill>
-          <a:blip r:embed="rId2">
+          <a:blip r:embed="rId2" cstate="print">
+            <a:grayscl/>
             <a:extLst>
               <a:ext uri="{28A0092B-C50C-407E-A947-70E740481C1C}">
-                <a14:useLocalDpi xmlns:a14="http://schemas.microsoft.com/office/drawing/2010/main" val="0"/>
+                <a14:useLocalDpi xmlns:a14="http://schemas.microsoft.com/office/drawing/2010/main"/>
               </a:ext>
             </a:extLst>
           </a:blip>
@@ -8833,7 +8983,7 @@
         </p:blipFill>
         <p:spPr bwMode="auto">
           <a:xfrm rot="10800000">
-            <a:off x="2505808" y="2487247"/>
+            <a:off x="2505808" y="1598579"/>
             <a:ext cx="1631950" cy="1587500"/>
           </a:xfrm>
           <a:prstGeom prst="rect">
@@ -8860,10 +9010,11 @@
           <p:nvPr/>
         </p:nvPicPr>
         <p:blipFill>
-          <a:blip r:embed="rId2">
+          <a:blip r:embed="rId2" cstate="print">
+            <a:grayscl/>
             <a:extLst>
               <a:ext uri="{28A0092B-C50C-407E-A947-70E740481C1C}">
-                <a14:useLocalDpi xmlns:a14="http://schemas.microsoft.com/office/drawing/2010/main" val="0"/>
+                <a14:useLocalDpi xmlns:a14="http://schemas.microsoft.com/office/drawing/2010/main"/>
               </a:ext>
             </a:extLst>
           </a:blip>
@@ -8874,7 +9025,7 @@
         </p:blipFill>
         <p:spPr bwMode="auto">
           <a:xfrm rot="10800000">
-            <a:off x="4668715" y="2518996"/>
+            <a:off x="4668715" y="1630328"/>
             <a:ext cx="1581150" cy="1555750"/>
           </a:xfrm>
           <a:prstGeom prst="rect">
@@ -8901,10 +9052,11 @@
           <p:nvPr/>
         </p:nvPicPr>
         <p:blipFill>
-          <a:blip r:embed="rId2">
+          <a:blip r:embed="rId2" cstate="print">
+            <a:grayscl/>
             <a:extLst>
               <a:ext uri="{28A0092B-C50C-407E-A947-70E740481C1C}">
-                <a14:useLocalDpi xmlns:a14="http://schemas.microsoft.com/office/drawing/2010/main" val="0"/>
+                <a14:useLocalDpi xmlns:a14="http://schemas.microsoft.com/office/drawing/2010/main"/>
               </a:ext>
             </a:extLst>
           </a:blip>
@@ -8915,7 +9067,7 @@
         </p:blipFill>
         <p:spPr bwMode="auto">
           <a:xfrm rot="10800000">
-            <a:off x="6585438" y="2487246"/>
+            <a:off x="6585438" y="1598578"/>
             <a:ext cx="1536700" cy="1587500"/>
           </a:xfrm>
           <a:prstGeom prst="rect">
@@ -9085,6 +9237,279 @@
           </a:p>
         </p:txBody>
       </p:sp>
+      <p:pic>
+        <p:nvPicPr>
+          <p:cNvPr id="1029" name="Picture 5"/>
+          <p:cNvPicPr>
+            <a:picLocks noChangeAspect="1" noChangeArrowheads="1"/>
+          </p:cNvPicPr>
+          <p:nvPr/>
+        </p:nvPicPr>
+        <p:blipFill>
+          <a:blip r:embed="rId2" cstate="print">
+            <a:grayscl/>
+            <a:extLst>
+              <a:ext uri="{28A0092B-C50C-407E-A947-70E740481C1C}">
+                <a14:useLocalDpi xmlns:a14="http://schemas.microsoft.com/office/drawing/2010/main"/>
+              </a:ext>
+            </a:extLst>
+          </a:blip>
+          <a:srcRect l="39520" t="56464" r="32584" b="4311"/>
+          <a:stretch>
+            <a:fillRect/>
+          </a:stretch>
+        </p:blipFill>
+        <p:spPr bwMode="auto">
+          <a:xfrm rot="10800000">
+            <a:off x="413238" y="3926742"/>
+            <a:ext cx="1606550" cy="1568450"/>
+          </a:xfrm>
+          <a:prstGeom prst="rect">
+            <a:avLst/>
+          </a:prstGeom>
+          <a:noFill/>
+          <a:extLst>
+            <a:ext uri="{909E8E84-426E-40DD-AFC4-6F175D3DCCD1}">
+              <a14:hiddenFill xmlns:a14="http://schemas.microsoft.com/office/drawing/2010/main">
+                <a:solidFill>
+                  <a:srgbClr val="FFFFFF"/>
+                </a:solidFill>
+              </a14:hiddenFill>
+            </a:ext>
+          </a:extLst>
+        </p:spPr>
+      </p:pic>
+      <p:pic>
+        <p:nvPicPr>
+          <p:cNvPr id="1028" name="Picture 4"/>
+          <p:cNvPicPr>
+            <a:picLocks noChangeAspect="1" noChangeArrowheads="1"/>
+          </p:cNvPicPr>
+          <p:nvPr/>
+        </p:nvPicPr>
+        <p:blipFill>
+          <a:blip r:embed="rId2" cstate="print">
+            <a:grayscl/>
+            <a:extLst>
+              <a:ext uri="{28A0092B-C50C-407E-A947-70E740481C1C}">
+                <a14:useLocalDpi xmlns:a14="http://schemas.microsoft.com/office/drawing/2010/main"/>
+              </a:ext>
+            </a:extLst>
+          </a:blip>
+          <a:srcRect l="9444" t="56866" r="63136" b="4129"/>
+          <a:stretch>
+            <a:fillRect/>
+          </a:stretch>
+        </p:blipFill>
+        <p:spPr bwMode="auto">
+          <a:xfrm rot="10800000">
+            <a:off x="2019788" y="3936267"/>
+            <a:ext cx="1581150" cy="1568450"/>
+          </a:xfrm>
+          <a:prstGeom prst="rect">
+            <a:avLst/>
+          </a:prstGeom>
+          <a:noFill/>
+          <a:extLst>
+            <a:ext uri="{909E8E84-426E-40DD-AFC4-6F175D3DCCD1}">
+              <a14:hiddenFill xmlns:a14="http://schemas.microsoft.com/office/drawing/2010/main">
+                <a:solidFill>
+                  <a:srgbClr val="FFFFFF"/>
+                </a:solidFill>
+              </a14:hiddenFill>
+            </a:ext>
+          </a:extLst>
+        </p:spPr>
+      </p:pic>
+      <p:pic>
+        <p:nvPicPr>
+          <p:cNvPr id="1027" name="Picture 3"/>
+          <p:cNvPicPr>
+            <a:picLocks noChangeAspect="1" noChangeArrowheads="1"/>
+          </p:cNvPicPr>
+          <p:nvPr/>
+        </p:nvPicPr>
+        <p:blipFill>
+          <a:blip r:embed="rId2" cstate="print">
+            <a:grayscl/>
+            <a:extLst>
+              <a:ext uri="{28A0092B-C50C-407E-A947-70E740481C1C}">
+                <a14:useLocalDpi xmlns:a14="http://schemas.microsoft.com/office/drawing/2010/main"/>
+              </a:ext>
+            </a:extLst>
+          </a:blip>
+          <a:srcRect l="67863" t="4256" r="4018" b="56396"/>
+          <a:stretch>
+            <a:fillRect/>
+          </a:stretch>
+        </p:blipFill>
+        <p:spPr bwMode="auto">
+          <a:xfrm rot="10800000">
+            <a:off x="3376730" y="3958249"/>
+            <a:ext cx="1631950" cy="1587500"/>
+          </a:xfrm>
+          <a:prstGeom prst="rect">
+            <a:avLst/>
+          </a:prstGeom>
+          <a:noFill/>
+          <a:extLst>
+            <a:ext uri="{909E8E84-426E-40DD-AFC4-6F175D3DCCD1}">
+              <a14:hiddenFill xmlns:a14="http://schemas.microsoft.com/office/drawing/2010/main">
+                <a:solidFill>
+                  <a:srgbClr val="FFFFFF"/>
+                </a:solidFill>
+              </a14:hiddenFill>
+            </a:ext>
+          </a:extLst>
+        </p:spPr>
+      </p:pic>
+      <p:pic>
+        <p:nvPicPr>
+          <p:cNvPr id="1026" name="Picture 2"/>
+          <p:cNvPicPr>
+            <a:picLocks noChangeAspect="1" noChangeArrowheads="1"/>
+          </p:cNvPicPr>
+          <p:nvPr/>
+        </p:nvPicPr>
+        <p:blipFill>
+          <a:blip r:embed="rId2" cstate="print">
+            <a:grayscl/>
+            <a:extLst>
+              <a:ext uri="{28A0092B-C50C-407E-A947-70E740481C1C}">
+                <a14:useLocalDpi xmlns:a14="http://schemas.microsoft.com/office/drawing/2010/main"/>
+              </a:ext>
+            </a:extLst>
+          </a:blip>
+          <a:srcRect l="36130" t="4028" r="36328" b="57039"/>
+          <a:stretch>
+            <a:fillRect/>
+          </a:stretch>
+        </p:blipFill>
+        <p:spPr bwMode="auto">
+          <a:xfrm rot="10800000">
+            <a:off x="5007461" y="3942617"/>
+            <a:ext cx="1581150" cy="1555750"/>
+          </a:xfrm>
+          <a:prstGeom prst="rect">
+            <a:avLst/>
+          </a:prstGeom>
+          <a:noFill/>
+          <a:extLst>
+            <a:ext uri="{909E8E84-426E-40DD-AFC4-6F175D3DCCD1}">
+              <a14:hiddenFill xmlns:a14="http://schemas.microsoft.com/office/drawing/2010/main">
+                <a:solidFill>
+                  <a:srgbClr val="FFFFFF"/>
+                </a:solidFill>
+              </a14:hiddenFill>
+            </a:ext>
+          </a:extLst>
+        </p:spPr>
+      </p:pic>
+      <p:pic>
+        <p:nvPicPr>
+          <p:cNvPr id="1025" name="Bild 1"/>
+          <p:cNvPicPr>
+            <a:picLocks noChangeAspect="1" noChangeArrowheads="1"/>
+          </p:cNvPicPr>
+          <p:nvPr/>
+        </p:nvPicPr>
+        <p:blipFill>
+          <a:blip r:embed="rId2" cstate="print">
+            <a:grayscl/>
+            <a:extLst>
+              <a:ext uri="{28A0092B-C50C-407E-A947-70E740481C1C}">
+                <a14:useLocalDpi xmlns:a14="http://schemas.microsoft.com/office/drawing/2010/main"/>
+              </a:ext>
+            </a:extLst>
+          </a:blip>
+          <a:srcRect l="4034" t="4477" r="68993" b="55969"/>
+          <a:stretch>
+            <a:fillRect/>
+          </a:stretch>
+        </p:blipFill>
+        <p:spPr bwMode="auto">
+          <a:xfrm rot="10800000">
+            <a:off x="6588612" y="3926742"/>
+            <a:ext cx="1536700" cy="1587500"/>
+          </a:xfrm>
+          <a:prstGeom prst="rect">
+            <a:avLst/>
+          </a:prstGeom>
+          <a:noFill/>
+          <a:extLst>
+            <a:ext uri="{909E8E84-426E-40DD-AFC4-6F175D3DCCD1}">
+              <a14:hiddenFill xmlns:a14="http://schemas.microsoft.com/office/drawing/2010/main">
+                <a:solidFill>
+                  <a:srgbClr val="FFFFFF"/>
+                </a:solidFill>
+              </a14:hiddenFill>
+            </a:ext>
+          </a:extLst>
+        </p:spPr>
+      </p:pic>
+      <p:sp>
+        <p:nvSpPr>
+          <p:cNvPr id="6" name="Rectangle 6"/>
+          <p:cNvSpPr>
+            <a:spLocks noChangeArrowheads="1"/>
+          </p:cNvSpPr>
+          <p:nvPr/>
+        </p:nvSpPr>
+        <p:spPr bwMode="auto">
+          <a:xfrm>
+            <a:off x="152400" y="152400"/>
+            <a:ext cx="9144000" cy="457200"/>
+          </a:xfrm>
+          <a:prstGeom prst="rect">
+            <a:avLst/>
+          </a:prstGeom>
+          <a:noFill/>
+          <a:ln>
+            <a:noFill/>
+          </a:ln>
+          <a:effectLst/>
+          <a:extLst>
+            <a:ext uri="{909E8E84-426E-40DD-AFC4-6F175D3DCCD1}">
+              <a14:hiddenFill xmlns:a14="http://schemas.microsoft.com/office/drawing/2010/main">
+                <a:solidFill>
+                  <a:schemeClr val="accent1"/>
+                </a:solidFill>
+              </a14:hiddenFill>
+            </a:ext>
+            <a:ext uri="{91240B29-F687-4F45-9708-019B960494DF}">
+              <a14:hiddenLine xmlns:a14="http://schemas.microsoft.com/office/drawing/2010/main" w="9525">
+                <a:solidFill>
+                  <a:schemeClr val="tx1"/>
+                </a:solidFill>
+                <a:miter lim="800000"/>
+                <a:headEnd/>
+                <a:tailEnd/>
+              </a14:hiddenLine>
+            </a:ext>
+            <a:ext uri="{AF507438-7753-43E0-B8FC-AC1667EBCBE1}">
+              <a14:hiddenEffects xmlns:a14="http://schemas.microsoft.com/office/drawing/2010/main">
+                <a:effectLst>
+                  <a:outerShdw dist="35921" dir="2700000" algn="ctr" rotWithShape="0">
+                    <a:schemeClr val="bg2"/>
+                  </a:outerShdw>
+                </a:effectLst>
+              </a14:hiddenEffects>
+            </a:ext>
+          </a:extLst>
+        </p:spPr>
+        <p:txBody>
+          <a:bodyPr vert="horz" wrap="none" lIns="91440" tIns="45720" rIns="91440" bIns="45720" numCol="1" anchor="ctr" anchorCtr="0" compatLnSpc="1">
+            <a:prstTxWarp prst="textNoShape">
+              <a:avLst/>
+            </a:prstTxWarp>
+            <a:spAutoFit/>
+          </a:bodyPr>
+          <a:lstStyle/>
+          <a:p>
+            <a:endParaRPr lang="de-CH"/>
+          </a:p>
+        </p:txBody>
+      </p:sp>
     </p:spTree>
     <p:extLst>
       <p:ext uri="{BB962C8B-B14F-4D97-AF65-F5344CB8AC3E}">
@@ -9095,6 +9520,13 @@
   <p:clrMapOvr>
     <a:masterClrMapping/>
   </p:clrMapOvr>
+  <p:timing>
+    <p:tnLst>
+      <p:par>
+        <p:cTn id="1" dur="indefinite" restart="never" nodeType="tmRoot"/>
+      </p:par>
+    </p:tnLst>
+  </p:timing>
 </p:sld>
 </file>
 
@@ -9130,7 +9562,20 @@
           <a:bodyPr/>
           <a:lstStyle/>
           <a:p>
-            <a:endParaRPr lang="de-CH"/>
+            <a:r>
+              <a:rPr lang="de-CH" dirty="0"/>
+              <a:t>Terminablauf mit einem Patienten im Büro des </a:t>
+            </a:r>
+            <a:r>
+              <a:rPr lang="de-CH" dirty="0" smtClean="0"/>
+              <a:t>Sozialarbeiter</a:t>
+            </a:r>
+          </a:p>
+          <a:p>
+            <a:pPr marL="0" indent="0">
+              <a:buNone/>
+            </a:pPr>
+            <a:endParaRPr lang="de-CH" dirty="0"/>
           </a:p>
         </p:txBody>
       </p:sp>
@@ -9151,16 +9596,284 @@
           <a:p>
             <a:r>
               <a:rPr lang="de-CH" dirty="0" smtClean="0"/>
-              <a:t>Prototype</a:t>
+              <a:t>Design</a:t>
             </a:r>
             <a:endParaRPr lang="de-CH" dirty="0"/>
+          </a:p>
+        </p:txBody>
+      </p:sp>
+      <p:pic>
+        <p:nvPicPr>
+          <p:cNvPr id="1029" name="Bild 16"/>
+          <p:cNvPicPr>
+            <a:picLocks noChangeAspect="1" noChangeArrowheads="1"/>
+          </p:cNvPicPr>
+          <p:nvPr/>
+        </p:nvPicPr>
+        <p:blipFill>
+          <a:blip r:embed="rId2">
+            <a:extLst>
+              <a:ext uri="{28A0092B-C50C-407E-A947-70E740481C1C}">
+                <a14:useLocalDpi xmlns:a14="http://schemas.microsoft.com/office/drawing/2010/main"/>
+              </a:ext>
+            </a:extLst>
+          </a:blip>
+          <a:srcRect/>
+          <a:stretch>
+            <a:fillRect/>
+          </a:stretch>
+        </p:blipFill>
+        <p:spPr bwMode="auto">
+          <a:xfrm rot="-5400000">
+            <a:off x="1429726" y="1917944"/>
+            <a:ext cx="1841500" cy="1758950"/>
+          </a:xfrm>
+          <a:prstGeom prst="rect">
+            <a:avLst/>
+          </a:prstGeom>
+          <a:noFill/>
+          <a:extLst>
+            <a:ext uri="{909E8E84-426E-40DD-AFC4-6F175D3DCCD1}">
+              <a14:hiddenFill xmlns:a14="http://schemas.microsoft.com/office/drawing/2010/main">
+                <a:solidFill>
+                  <a:srgbClr val="FFFFFF"/>
+                </a:solidFill>
+              </a14:hiddenFill>
+            </a:ext>
+          </a:extLst>
+        </p:spPr>
+      </p:pic>
+      <p:pic>
+        <p:nvPicPr>
+          <p:cNvPr id="1028" name="Bild 17"/>
+          <p:cNvPicPr>
+            <a:picLocks noChangeAspect="1" noChangeArrowheads="1"/>
+          </p:cNvPicPr>
+          <p:nvPr/>
+        </p:nvPicPr>
+        <p:blipFill>
+          <a:blip r:embed="rId3">
+            <a:extLst>
+              <a:ext uri="{28A0092B-C50C-407E-A947-70E740481C1C}">
+                <a14:useLocalDpi xmlns:a14="http://schemas.microsoft.com/office/drawing/2010/main"/>
+              </a:ext>
+            </a:extLst>
+          </a:blip>
+          <a:srcRect/>
+          <a:stretch>
+            <a:fillRect/>
+          </a:stretch>
+        </p:blipFill>
+        <p:spPr bwMode="auto">
+          <a:xfrm rot="-5400000">
+            <a:off x="3332284" y="2203694"/>
+            <a:ext cx="1835150" cy="1155700"/>
+          </a:xfrm>
+          <a:prstGeom prst="rect">
+            <a:avLst/>
+          </a:prstGeom>
+          <a:noFill/>
+          <a:extLst>
+            <a:ext uri="{909E8E84-426E-40DD-AFC4-6F175D3DCCD1}">
+              <a14:hiddenFill xmlns:a14="http://schemas.microsoft.com/office/drawing/2010/main">
+                <a:solidFill>
+                  <a:srgbClr val="FFFFFF"/>
+                </a:solidFill>
+              </a14:hiddenFill>
+            </a:ext>
+          </a:extLst>
+        </p:spPr>
+      </p:pic>
+      <p:pic>
+        <p:nvPicPr>
+          <p:cNvPr id="1027" name="Bild 18"/>
+          <p:cNvPicPr>
+            <a:picLocks noChangeAspect="1" noChangeArrowheads="1"/>
+          </p:cNvPicPr>
+          <p:nvPr/>
+        </p:nvPicPr>
+        <p:blipFill>
+          <a:blip r:embed="rId4">
+            <a:extLst>
+              <a:ext uri="{28A0092B-C50C-407E-A947-70E740481C1C}">
+                <a14:useLocalDpi xmlns:a14="http://schemas.microsoft.com/office/drawing/2010/main"/>
+              </a:ext>
+            </a:extLst>
+          </a:blip>
+          <a:srcRect/>
+          <a:stretch>
+            <a:fillRect/>
+          </a:stretch>
+        </p:blipFill>
+        <p:spPr bwMode="auto">
+          <a:xfrm rot="-5400000">
+            <a:off x="4970829" y="2235444"/>
+            <a:ext cx="1822450" cy="1079500"/>
+          </a:xfrm>
+          <a:prstGeom prst="rect">
+            <a:avLst/>
+          </a:prstGeom>
+          <a:noFill/>
+          <a:extLst>
+            <a:ext uri="{909E8E84-426E-40DD-AFC4-6F175D3DCCD1}">
+              <a14:hiddenFill xmlns:a14="http://schemas.microsoft.com/office/drawing/2010/main">
+                <a:solidFill>
+                  <a:srgbClr val="FFFFFF"/>
+                </a:solidFill>
+              </a14:hiddenFill>
+            </a:ext>
+          </a:extLst>
+        </p:spPr>
+      </p:pic>
+      <p:pic>
+        <p:nvPicPr>
+          <p:cNvPr id="1026" name="Bild 19"/>
+          <p:cNvPicPr>
+            <a:picLocks noChangeAspect="1" noChangeArrowheads="1"/>
+          </p:cNvPicPr>
+          <p:nvPr/>
+        </p:nvPicPr>
+        <p:blipFill>
+          <a:blip r:embed="rId5">
+            <a:extLst>
+              <a:ext uri="{28A0092B-C50C-407E-A947-70E740481C1C}">
+                <a14:useLocalDpi xmlns:a14="http://schemas.microsoft.com/office/drawing/2010/main"/>
+              </a:ext>
+            </a:extLst>
+          </a:blip>
+          <a:srcRect/>
+          <a:stretch>
+            <a:fillRect/>
+          </a:stretch>
+        </p:blipFill>
+        <p:spPr bwMode="auto">
+          <a:xfrm rot="-5400000">
+            <a:off x="1344001" y="4018084"/>
+            <a:ext cx="1682750" cy="1428750"/>
+          </a:xfrm>
+          <a:prstGeom prst="rect">
+            <a:avLst/>
+          </a:prstGeom>
+          <a:noFill/>
+          <a:extLst>
+            <a:ext uri="{909E8E84-426E-40DD-AFC4-6F175D3DCCD1}">
+              <a14:hiddenFill xmlns:a14="http://schemas.microsoft.com/office/drawing/2010/main">
+                <a:solidFill>
+                  <a:srgbClr val="FFFFFF"/>
+                </a:solidFill>
+              </a14:hiddenFill>
+            </a:ext>
+          </a:extLst>
+        </p:spPr>
+      </p:pic>
+      <p:pic>
+        <p:nvPicPr>
+          <p:cNvPr id="1025" name="Bild 20"/>
+          <p:cNvPicPr>
+            <a:picLocks noChangeAspect="1" noChangeArrowheads="1"/>
+          </p:cNvPicPr>
+          <p:nvPr/>
+        </p:nvPicPr>
+        <p:blipFill>
+          <a:blip r:embed="rId6">
+            <a:extLst>
+              <a:ext uri="{28A0092B-C50C-407E-A947-70E740481C1C}">
+                <a14:useLocalDpi xmlns:a14="http://schemas.microsoft.com/office/drawing/2010/main"/>
+              </a:ext>
+            </a:extLst>
+          </a:blip>
+          <a:srcRect/>
+          <a:stretch>
+            <a:fillRect/>
+          </a:stretch>
+        </p:blipFill>
+        <p:spPr bwMode="auto">
+          <a:xfrm rot="-5400000">
+            <a:off x="3402133" y="4030784"/>
+            <a:ext cx="1695450" cy="1403350"/>
+          </a:xfrm>
+          <a:prstGeom prst="rect">
+            <a:avLst/>
+          </a:prstGeom>
+          <a:noFill/>
+          <a:extLst>
+            <a:ext uri="{909E8E84-426E-40DD-AFC4-6F175D3DCCD1}">
+              <a14:hiddenFill xmlns:a14="http://schemas.microsoft.com/office/drawing/2010/main">
+                <a:solidFill>
+                  <a:srgbClr val="FFFFFF"/>
+                </a:solidFill>
+              </a14:hiddenFill>
+            </a:ext>
+          </a:extLst>
+        </p:spPr>
+      </p:pic>
+      <p:sp>
+        <p:nvSpPr>
+          <p:cNvPr id="4" name="Rectangle 6"/>
+          <p:cNvSpPr>
+            <a:spLocks noChangeArrowheads="1"/>
+          </p:cNvSpPr>
+          <p:nvPr/>
+        </p:nvSpPr>
+        <p:spPr bwMode="auto">
+          <a:xfrm>
+            <a:off x="0" y="0"/>
+            <a:ext cx="9144000" cy="457200"/>
+          </a:xfrm>
+          <a:prstGeom prst="rect">
+            <a:avLst/>
+          </a:prstGeom>
+          <a:noFill/>
+          <a:ln>
+            <a:noFill/>
+          </a:ln>
+          <a:effectLst/>
+          <a:extLst>
+            <a:ext uri="{909E8E84-426E-40DD-AFC4-6F175D3DCCD1}">
+              <a14:hiddenFill xmlns:a14="http://schemas.microsoft.com/office/drawing/2010/main">
+                <a:solidFill>
+                  <a:schemeClr val="accent1"/>
+                </a:solidFill>
+              </a14:hiddenFill>
+            </a:ext>
+            <a:ext uri="{91240B29-F687-4F45-9708-019B960494DF}">
+              <a14:hiddenLine xmlns:a14="http://schemas.microsoft.com/office/drawing/2010/main" w="9525">
+                <a:solidFill>
+                  <a:schemeClr val="tx1"/>
+                </a:solidFill>
+                <a:miter lim="800000"/>
+                <a:headEnd/>
+                <a:tailEnd/>
+              </a14:hiddenLine>
+            </a:ext>
+            <a:ext uri="{AF507438-7753-43E0-B8FC-AC1667EBCBE1}">
+              <a14:hiddenEffects xmlns:a14="http://schemas.microsoft.com/office/drawing/2010/main">
+                <a:effectLst>
+                  <a:outerShdw dist="35921" dir="2700000" algn="ctr" rotWithShape="0">
+                    <a:schemeClr val="bg2"/>
+                  </a:outerShdw>
+                </a:effectLst>
+              </a14:hiddenEffects>
+            </a:ext>
+          </a:extLst>
+        </p:spPr>
+        <p:txBody>
+          <a:bodyPr vert="horz" wrap="none" lIns="91440" tIns="45720" rIns="91440" bIns="45720" numCol="1" anchor="ctr" anchorCtr="0" compatLnSpc="1">
+            <a:prstTxWarp prst="textNoShape">
+              <a:avLst/>
+            </a:prstTxWarp>
+            <a:spAutoFit/>
+          </a:bodyPr>
+          <a:lstStyle/>
+          <a:p>
+            <a:endParaRPr lang="de-CH"/>
           </a:p>
         </p:txBody>
       </p:sp>
     </p:spTree>
     <p:extLst>
       <p:ext uri="{BB962C8B-B14F-4D97-AF65-F5344CB8AC3E}">
-        <p14:creationId xmlns:p14="http://schemas.microsoft.com/office/powerpoint/2010/main" val="1251349615"/>
+        <p14:creationId xmlns:p14="http://schemas.microsoft.com/office/powerpoint/2010/main" val="2772796197"/>
       </p:ext>
     </p:extLst>
   </p:cSld>
@@ -9229,17 +9942,83 @@
           <a:lstStyle/>
           <a:p>
             <a:r>
-              <a:rPr lang="de-CH" dirty="0" err="1" smtClean="0"/>
-              <a:t>Valitation</a:t>
+              <a:rPr lang="de-CH" dirty="0" smtClean="0"/>
+              <a:t>Prototype</a:t>
             </a:r>
             <a:endParaRPr lang="de-CH" dirty="0"/>
           </a:p>
         </p:txBody>
       </p:sp>
+      <p:pic>
+        <p:nvPicPr>
+          <p:cNvPr id="4" name="Grafik 3"/>
+          <p:cNvPicPr/>
+          <p:nvPr/>
+        </p:nvPicPr>
+        <p:blipFill>
+          <a:blip r:embed="rId2">
+            <a:extLst>
+              <a:ext uri="{28A0092B-C50C-407E-A947-70E740481C1C}">
+                <a14:useLocalDpi xmlns:a14="http://schemas.microsoft.com/office/drawing/2010/main"/>
+              </a:ext>
+            </a:extLst>
+          </a:blip>
+          <a:srcRect/>
+          <a:stretch>
+            <a:fillRect/>
+          </a:stretch>
+        </p:blipFill>
+        <p:spPr bwMode="auto">
+          <a:xfrm>
+            <a:off x="1786467" y="1596390"/>
+            <a:ext cx="2308860" cy="3657600"/>
+          </a:xfrm>
+          <a:prstGeom prst="rect">
+            <a:avLst/>
+          </a:prstGeom>
+          <a:noFill/>
+          <a:ln>
+            <a:noFill/>
+          </a:ln>
+        </p:spPr>
+      </p:pic>
+      <p:pic>
+        <p:nvPicPr>
+          <p:cNvPr id="5" name="Grafik 4"/>
+          <p:cNvPicPr/>
+          <p:nvPr/>
+        </p:nvPicPr>
+        <p:blipFill>
+          <a:blip r:embed="rId3">
+            <a:extLst>
+              <a:ext uri="{28A0092B-C50C-407E-A947-70E740481C1C}">
+                <a14:useLocalDpi xmlns:a14="http://schemas.microsoft.com/office/drawing/2010/main"/>
+              </a:ext>
+            </a:extLst>
+          </a:blip>
+          <a:srcRect/>
+          <a:stretch>
+            <a:fillRect/>
+          </a:stretch>
+        </p:blipFill>
+        <p:spPr bwMode="auto">
+          <a:xfrm>
+            <a:off x="5207098" y="1588770"/>
+            <a:ext cx="2369820" cy="3665220"/>
+          </a:xfrm>
+          <a:prstGeom prst="rect">
+            <a:avLst/>
+          </a:prstGeom>
+          <a:noFill/>
+          <a:ln>
+            <a:noFill/>
+          </a:ln>
+        </p:spPr>
+      </p:pic>
     </p:spTree>
     <p:extLst>
       <p:ext uri="{BB962C8B-B14F-4D97-AF65-F5344CB8AC3E}">
-        <p14:creationId xmlns:p14="http://schemas.microsoft.com/office/powerpoint/2010/main" val="605634403"/>
+        <p14:creationId xmlns:p14="http://schemas.microsoft.com/office/powerpoint/2010/main" val="1251349615"/>
       </p:ext>
     </p:extLst>
   </p:cSld>

</xml_diff>